<commit_message>
enhancement  & prepare the perview
</commit_message>
<xml_diff>
--- a/Chapter4.Memory Hirearchy.pptx
+++ b/Chapter4.Memory Hirearchy.pptx
@@ -273,7 +273,7 @@
           <a:p>
             <a:fld id="{966D5B4E-BF3E-3B45-A4BA-D6C3B92870D7}" type="datetimeFigureOut">
               <a:rPr lang="en-US" smtClean="0"/>
-              <a:t>6/12/2023</a:t>
+              <a:t>6/15/2023</a:t>
             </a:fld>
             <a:endParaRPr lang="en-US" dirty="0"/>
           </a:p>
@@ -450,7 +450,7 @@
           <a:p>
             <a:fld id="{F5A8621B-8C8E-49BA-8772-41D0FE75A082}" type="datetimeFigureOut">
               <a:rPr lang="en-US" smtClean="0"/>
-              <a:t>6/12/2023</a:t>
+              <a:t>6/15/2023</a:t>
             </a:fld>
             <a:endParaRPr lang="en-US" dirty="0"/>
           </a:p>
@@ -11795,12 +11795,12 @@
         </p:spPr>
         <p:txBody>
           <a:bodyPr>
-            <a:normAutofit fontScale="85000" lnSpcReduction="10000"/>
+            <a:normAutofit/>
           </a:bodyPr>
           <a:lstStyle/>
           <a:p>
             <a:r>
-              <a:rPr lang="en-US" sz="1800" b="0" i="0" u="none" strike="noStrike" baseline="0" dirty="0">
+              <a:rPr lang="en-US" sz="1600" b="0" i="0" u="none" strike="noStrike" baseline="0" dirty="0">
                 <a:solidFill>
                   <a:srgbClr val="2A1A00"/>
                 </a:solidFill>
@@ -11809,7 +11809,7 @@
               <a:t>•</a:t>
             </a:r>
             <a:r>
-              <a:rPr lang="en-US" sz="1800" b="0" i="0" u="none" strike="noStrike" baseline="0" dirty="0">
+              <a:rPr lang="en-US" sz="1600" b="0" i="0" u="none" strike="noStrike" baseline="0" dirty="0">
                 <a:solidFill>
                   <a:srgbClr val="585858"/>
                 </a:solidFill>
@@ -11820,7 +11820,7 @@
           </a:p>
           <a:p>
             <a:r>
-              <a:rPr lang="en-US" sz="1800" b="0" i="0" u="none" strike="noStrike" baseline="0" dirty="0">
+              <a:rPr lang="en-US" sz="1600" b="0" i="0" u="none" strike="noStrike" baseline="0" dirty="0">
                 <a:solidFill>
                   <a:srgbClr val="2A1A00"/>
                 </a:solidFill>
@@ -11829,7 +11829,7 @@
               <a:t>•</a:t>
             </a:r>
             <a:r>
-              <a:rPr lang="en-US" sz="1800" b="0" i="0" u="none" strike="noStrike" baseline="0" dirty="0">
+              <a:rPr lang="en-US" sz="1600" b="0" i="0" u="none" strike="noStrike" baseline="0" dirty="0">
                 <a:solidFill>
                   <a:srgbClr val="585858"/>
                 </a:solidFill>
@@ -11840,7 +11840,7 @@
           </a:p>
           <a:p>
             <a:r>
-              <a:rPr lang="en-US" sz="1800" b="0" i="0" u="none" strike="noStrike" baseline="0" dirty="0">
+              <a:rPr lang="en-US" sz="1600" b="0" i="0" u="none" strike="noStrike" baseline="0" dirty="0">
                 <a:solidFill>
                   <a:srgbClr val="2A1A00"/>
                 </a:solidFill>
@@ -11849,7 +11849,7 @@
               <a:t>•</a:t>
             </a:r>
             <a:r>
-              <a:rPr lang="en-US" sz="1800" b="0" i="0" u="none" strike="noStrike" baseline="0" dirty="0">
+              <a:rPr lang="en-US" sz="1600" b="0" i="0" u="none" strike="noStrike" baseline="0" dirty="0">
                 <a:solidFill>
                   <a:srgbClr val="585858"/>
                 </a:solidFill>
@@ -11858,7 +11858,7 @@
               <a:t>2</a:t>
             </a:r>
             <a:r>
-              <a:rPr lang="fa-IR" sz="1800" b="0" i="0" u="none" strike="noStrike" baseline="0" dirty="0">
+              <a:rPr lang="fa-IR" sz="1600" b="0" i="0" u="none" strike="noStrike" baseline="0" dirty="0">
                 <a:solidFill>
                   <a:srgbClr val="585858"/>
                 </a:solidFill>
@@ -11867,7 +11867,7 @@
               <a:t>^</a:t>
             </a:r>
             <a:r>
-              <a:rPr lang="en-US" sz="1800" b="0" i="0" u="none" strike="noStrike" baseline="0" dirty="0">
+              <a:rPr lang="en-US" sz="1600" b="0" i="0" u="none" strike="noStrike" baseline="0" dirty="0">
                 <a:solidFill>
                   <a:srgbClr val="585858"/>
                 </a:solidFill>
@@ -11876,7 +11876,7 @@
               <a:t>14 x (32+(32-14-2)+1)=2</a:t>
             </a:r>
             <a:r>
-              <a:rPr lang="fa-IR" sz="1800" b="0" i="0" u="none" strike="noStrike" baseline="0" dirty="0">
+              <a:rPr lang="fa-IR" sz="1600" b="0" i="0" u="none" strike="noStrike" baseline="0" dirty="0">
                 <a:solidFill>
                   <a:srgbClr val="585858"/>
                 </a:solidFill>
@@ -11885,7 +11885,7 @@
               <a:t>^</a:t>
             </a:r>
             <a:r>
-              <a:rPr lang="en-US" sz="1800" b="0" i="0" u="none" strike="noStrike" baseline="0" dirty="0">
+              <a:rPr lang="en-US" sz="1600" b="0" i="0" u="none" strike="noStrike" baseline="0" dirty="0">
                 <a:solidFill>
                   <a:srgbClr val="585858"/>
                 </a:solidFill>
@@ -11894,7 +11894,7 @@
               <a:t>14x49=2</a:t>
             </a:r>
             <a:r>
-              <a:rPr lang="fa-IR" sz="1800" b="0" i="0" u="none" strike="noStrike" baseline="0" dirty="0">
+              <a:rPr lang="fa-IR" sz="1600" b="0" i="0" u="none" strike="noStrike" baseline="0" dirty="0">
                 <a:solidFill>
                   <a:srgbClr val="585858"/>
                 </a:solidFill>
@@ -11903,7 +11903,7 @@
               <a:t>^</a:t>
             </a:r>
             <a:r>
-              <a:rPr lang="en-US" sz="1800" b="0" i="0" u="none" strike="noStrike" baseline="0" dirty="0">
+              <a:rPr lang="en-US" sz="1600" b="0" i="0" u="none" strike="noStrike" baseline="0" dirty="0">
                 <a:solidFill>
                   <a:srgbClr val="585858"/>
                 </a:solidFill>
@@ -12033,7 +12033,7 @@
         </p:nvSpPr>
         <p:spPr>
           <a:xfrm>
-            <a:off x="4446036" y="1689826"/>
+            <a:off x="4422710" y="1689826"/>
             <a:ext cx="4572000" cy="3046988"/>
           </a:xfrm>
           <a:prstGeom prst="rect">
@@ -26119,15 +26119,6 @@
 </file>
 
 <file path=customXml/item1.xml><?xml version="1.0" encoding="utf-8"?>
-<?mso-contentType ?>
-<FormTemplates xmlns="http://schemas.microsoft.com/sharepoint/v3/contenttype/forms">
-  <Display>DocumentLibraryForm</Display>
-  <Edit>DocumentLibraryForm</Edit>
-  <New>DocumentLibraryForm</New>
-</FormTemplates>
-</file>
-
-<file path=customXml/item2.xml><?xml version="1.0" encoding="utf-8"?>
 <p:properties xmlns:p="http://schemas.microsoft.com/office/2006/metadata/properties" xmlns:xsi="http://www.w3.org/2001/XMLSchema-instance" xmlns:pc="http://schemas.microsoft.com/office/infopath/2007/PartnerControls">
   <documentManagement>
     <Status xmlns="71af3243-3dd4-4a8d-8c0d-dd76da1f02a5">Not started</Status>
@@ -26136,7 +26127,7 @@
 </p:properties>
 </file>
 
-<file path=customXml/item3.xml><?xml version="1.0" encoding="utf-8"?>
+<file path=customXml/item2.xml><?xml version="1.0" encoding="utf-8"?>
 <ct:contentTypeSchema xmlns:ct="http://schemas.microsoft.com/office/2006/metadata/contentType" xmlns:ma="http://schemas.microsoft.com/office/2006/metadata/properties/metaAttributes" ct:_="" ma:_="" ma:contentTypeName="Document" ma:contentTypeID="0x01010079F111ED35F8CC479449609E8A0923A6" ma:contentTypeVersion="12" ma:contentTypeDescription="Create a new document." ma:contentTypeScope="" ma:versionID="426e97fa315356fffbdcd9876fe988c2">
   <xsd:schema xmlns:xsd="http://www.w3.org/2001/XMLSchema" xmlns:xs="http://www.w3.org/2001/XMLSchema" xmlns:p="http://schemas.microsoft.com/office/2006/metadata/properties" xmlns:ns2="71af3243-3dd4-4a8d-8c0d-dd76da1f02a5" xmlns:ns3="16c05727-aa75-4e4a-9b5f-8a80a1165891" targetNamespace="http://schemas.microsoft.com/office/2006/metadata/properties" ma:root="true" ma:fieldsID="14b8f0def80e6d70ce3def20c90759ae" ns2:_="" ns3:_="">
     <xsd:import namespace="71af3243-3dd4-4a8d-8c0d-dd76da1f02a5"/>
@@ -26357,15 +26348,16 @@
 </ct:contentTypeSchema>
 </file>
 
-<file path=customXml/itemProps1.xml><?xml version="1.0" encoding="utf-8"?>
-<ds:datastoreItem xmlns:ds="http://schemas.openxmlformats.org/officeDocument/2006/customXml" ds:itemID="{1B7E2D32-4FDD-4266-880C-17595B801432}">
-  <ds:schemaRefs>
-    <ds:schemaRef ds:uri="http://schemas.microsoft.com/sharepoint/v3/contenttype/forms"/>
-  </ds:schemaRefs>
-</ds:datastoreItem>
+<file path=customXml/item3.xml><?xml version="1.0" encoding="utf-8"?>
+<?mso-contentType ?>
+<FormTemplates xmlns="http://schemas.microsoft.com/sharepoint/v3/contenttype/forms">
+  <Display>DocumentLibraryForm</Display>
+  <Edit>DocumentLibraryForm</Edit>
+  <New>DocumentLibraryForm</New>
+</FormTemplates>
 </file>
 
-<file path=customXml/itemProps2.xml><?xml version="1.0" encoding="utf-8"?>
+<file path=customXml/itemProps1.xml><?xml version="1.0" encoding="utf-8"?>
 <ds:datastoreItem xmlns:ds="http://schemas.openxmlformats.org/officeDocument/2006/customXml" ds:itemID="{E3D9F223-918A-45AF-9B53-56AB9E5E2182}">
   <ds:schemaRefs>
     <ds:schemaRef ds:uri="http://schemas.microsoft.com/office/2006/metadata/properties"/>
@@ -26375,7 +26367,7 @@
 </ds:datastoreItem>
 </file>
 
-<file path=customXml/itemProps3.xml><?xml version="1.0" encoding="utf-8"?>
+<file path=customXml/itemProps2.xml><?xml version="1.0" encoding="utf-8"?>
 <ds:datastoreItem xmlns:ds="http://schemas.openxmlformats.org/officeDocument/2006/customXml" ds:itemID="{55BB9993-D5F9-46FA-B2E5-80E3632E9820}">
   <ds:schemaRefs>
     <ds:schemaRef ds:uri="http://schemas.microsoft.com/office/2006/metadata/contentType"/>
@@ -26392,4 +26384,12 @@
     <ds:schemaRef ds:uri="http://schemas.microsoft.com/internal/obd"/>
   </ds:schemaRefs>
 </ds:datastoreItem>
+</file>
+
+<file path=customXml/itemProps3.xml><?xml version="1.0" encoding="utf-8"?>
+<ds:datastoreItem xmlns:ds="http://schemas.openxmlformats.org/officeDocument/2006/customXml" ds:itemID="{1B7E2D32-4FDD-4266-880C-17595B801432}">
+  <ds:schemaRefs>
+    <ds:schemaRef ds:uri="http://schemas.microsoft.com/sharepoint/v3/contenttype/forms"/>
+  </ds:schemaRefs>
+</ds:datastoreItem>
 </file>
</xml_diff>

<commit_message>
chp 4 second check
</commit_message>
<xml_diff>
--- a/Chapter4.Memory Hirearchy.pptx
+++ b/Chapter4.Memory Hirearchy.pptx
@@ -273,7 +273,7 @@
           <a:p>
             <a:fld id="{966D5B4E-BF3E-3B45-A4BA-D6C3B92870D7}" type="datetimeFigureOut">
               <a:rPr lang="en-US" smtClean="0"/>
-              <a:t>6/15/2023</a:t>
+              <a:t>6/17/2023</a:t>
             </a:fld>
             <a:endParaRPr lang="en-US" dirty="0"/>
           </a:p>
@@ -450,7 +450,7 @@
           <a:p>
             <a:fld id="{F5A8621B-8C8E-49BA-8772-41D0FE75A082}" type="datetimeFigureOut">
               <a:rPr lang="en-US" smtClean="0"/>
-              <a:t>6/15/2023</a:t>
+              <a:t>6/17/2023</a:t>
             </a:fld>
             <a:endParaRPr lang="en-US" dirty="0"/>
           </a:p>
@@ -9440,7 +9440,7 @@
         </p:nvSpPr>
         <p:spPr>
           <a:xfrm>
-            <a:off x="4665307" y="1097322"/>
+            <a:off x="4711962" y="846167"/>
             <a:ext cx="4156787" cy="3416320"/>
           </a:xfrm>
           <a:prstGeom prst="rect">
@@ -9456,15 +9456,18 @@
           <a:p>
             <a:pPr algn="r" rtl="1"/>
             <a:r>
-              <a:rPr lang="en-US" b="0" i="0" dirty="0">
+              <a:rPr lang="fa-IR" b="0" i="0" dirty="0">
                 <a:solidFill>
                   <a:srgbClr val="3C4043"/>
                 </a:solidFill>
                 <a:effectLst/>
                 <a:latin typeface="Roboto" panose="02000000000000000000" pitchFamily="2" charset="0"/>
               </a:rPr>
-              <a:t>•</a:t>
-            </a:r>
+              <a:t>•طرح آدرس دهی در حافظه پنهان مستقیم:</a:t>
+            </a:r>
+          </a:p>
+          <a:p>
+            <a:pPr algn="r" rtl="1"/>
             <a:r>
               <a:rPr lang="fa-IR" b="0" i="0" dirty="0">
                 <a:solidFill>
@@ -9473,58 +9476,64 @@
                 <a:effectLst/>
                 <a:latin typeface="Roboto" panose="02000000000000000000" pitchFamily="2" charset="0"/>
               </a:rPr>
-              <a:t>طرح آدرس دهی در حافظه پنهان مستقیم: -آدرس بلوک کش = آدرس بلوک حافظه اندازه مود کش (یکتا) -اگر اندازه کش = 2 متر، آدرس کش = </a:t>
-            </a:r>
-            <a:r>
-              <a:rPr lang="en-US" b="0" i="0" dirty="0">
+              <a:t>-آدرس بلوک کش = آدرس بلوک حافظه اندازه مود کش (یکتا)</a:t>
+            </a:r>
+          </a:p>
+          <a:p>
+            <a:pPr algn="r" rtl="1"/>
+            <a:r>
+              <a:rPr lang="fa-IR" b="0" i="0" dirty="0">
                 <a:solidFill>
                   <a:srgbClr val="3C4043"/>
                 </a:solidFill>
                 <a:effectLst/>
                 <a:latin typeface="Roboto" panose="02000000000000000000" pitchFamily="2" charset="0"/>
               </a:rPr>
-              <a:t>m </a:t>
-            </a:r>
-            <a:r>
-              <a:rPr lang="fa-IR" b="0" i="0" dirty="0">
+              <a:t>-اگر اندازه کش = 2 متر، آدرس کش = </a:t>
+            </a:r>
+            <a:r>
+              <a:rPr lang="en-US" b="0" i="0" dirty="0">
                 <a:solidFill>
                   <a:srgbClr val="3C4043"/>
                 </a:solidFill>
                 <a:effectLst/>
                 <a:latin typeface="Roboto" panose="02000000000000000000" pitchFamily="2" charset="0"/>
               </a:rPr>
-              <a:t>بیت کمتر از آدرس حافظه </a:t>
-            </a:r>
-            <a:r>
-              <a:rPr lang="en-US" b="0" i="0" dirty="0">
+              <a:t>m </a:t>
+            </a:r>
+            <a:r>
+              <a:rPr lang="fa-IR" b="0" i="0" dirty="0">
                 <a:solidFill>
                   <a:srgbClr val="3C4043"/>
                 </a:solidFill>
                 <a:effectLst/>
                 <a:latin typeface="Roboto" panose="02000000000000000000" pitchFamily="2" charset="0"/>
               </a:rPr>
-              <a:t>n </a:t>
-            </a:r>
-            <a:r>
-              <a:rPr lang="fa-IR" b="0" i="0" dirty="0">
+              <a:t>بیت کمتر از آدرس حافظه </a:t>
+            </a:r>
+            <a:r>
+              <a:rPr lang="en-US" b="0" i="0" dirty="0">
                 <a:solidFill>
                   <a:srgbClr val="3C4043"/>
                 </a:solidFill>
                 <a:effectLst/>
                 <a:latin typeface="Roboto" panose="02000000000000000000" pitchFamily="2" charset="0"/>
               </a:rPr>
-              <a:t>بیتی - </a:t>
-            </a:r>
-            <a:r>
-              <a:rPr lang="en-US" b="0" i="0" dirty="0">
+              <a:t>n </a:t>
+            </a:r>
+            <a:r>
+              <a:rPr lang="fa-IR" b="0" i="0" dirty="0">
                 <a:solidFill>
                   <a:srgbClr val="3C4043"/>
                 </a:solidFill>
                 <a:effectLst/>
                 <a:latin typeface="Roboto" panose="02000000000000000000" pitchFamily="2" charset="0"/>
               </a:rPr>
-              <a:t>n-m </a:t>
-            </a:r>
+              <a:t>بیتی</a:t>
+            </a:r>
+          </a:p>
+          <a:p>
+            <a:pPr algn="r" rtl="1"/>
             <a:r>
               <a:rPr lang="fa-IR" b="0" i="0" dirty="0">
                 <a:solidFill>
@@ -9533,47 +9542,67 @@
                 <a:effectLst/>
                 <a:latin typeface="Roboto" panose="02000000000000000000" pitchFamily="2" charset="0"/>
               </a:rPr>
-              <a:t>بیت های بالای باقی مانده به عنوان بیت های برچسب در هر بلوک کش نگهداری می شوند -همچنین به یک بیت معتبر برای شناسایی ورودی معتبر نیاز دارید -در اینجا اندازه کش 8 (23) =&gt; 3 بیت برای شاخص است </a:t>
-            </a:r>
-            <a:endParaRPr lang="en-US" b="0" i="0" dirty="0">
-              <a:solidFill>
-                <a:srgbClr val="3C4043"/>
-              </a:solidFill>
-              <a:effectLst/>
-              <a:latin typeface="Roboto" panose="02000000000000000000" pitchFamily="2" charset="0"/>
-            </a:endParaRPr>
-          </a:p>
-          <a:p>
-            <a:pPr algn="r" rtl="1"/>
-            <a:r>
-              <a:rPr lang="fa-IR" b="0" i="0" dirty="0">
+              <a:t>- </a:t>
+            </a:r>
+            <a:r>
+              <a:rPr lang="en-US" b="0" i="0" dirty="0">
                 <a:solidFill>
                   <a:srgbClr val="3C4043"/>
                 </a:solidFill>
                 <a:effectLst/>
                 <a:latin typeface="Roboto" panose="02000000000000000000" pitchFamily="2" charset="0"/>
               </a:rPr>
-              <a:t>-2 بیت برای برچسب</a:t>
-            </a:r>
-          </a:p>
-          <a:p>
-            <a:pPr algn="r" rtl="1"/>
-            <a:br>
+              <a:t>n-m </a:t>
+            </a:r>
+            <a:r>
               <a:rPr lang="fa-IR" b="0" i="0" dirty="0">
                 <a:solidFill>
-                  <a:srgbClr val="5F6368"/>
+                  <a:srgbClr val="3C4043"/>
                 </a:solidFill>
                 <a:effectLst/>
                 <a:latin typeface="Roboto" panose="02000000000000000000" pitchFamily="2" charset="0"/>
               </a:rPr>
-            </a:br>
-            <a:endParaRPr lang="fa-IR" b="0" i="0" dirty="0">
-              <a:solidFill>
-                <a:srgbClr val="3C4043"/>
-              </a:solidFill>
-              <a:effectLst/>
-              <a:latin typeface="Roboto" panose="02000000000000000000" pitchFamily="2" charset="0"/>
-            </a:endParaRPr>
+              <a:t>بیت های بالای باقی مانده به عنوان بیت های برچسب در هر بلوک کش نگهداری می شوند</a:t>
+            </a:r>
+          </a:p>
+          <a:p>
+            <a:pPr algn="r" rtl="1"/>
+            <a:r>
+              <a:rPr lang="fa-IR" b="0" i="0" dirty="0">
+                <a:solidFill>
+                  <a:srgbClr val="3C4043"/>
+                </a:solidFill>
+                <a:effectLst/>
+                <a:latin typeface="Roboto" panose="02000000000000000000" pitchFamily="2" charset="0"/>
+              </a:rPr>
+              <a:t>-همچنین به یک بیت معتبر برای شناسایی ورودی معتبر نیاز دارید</a:t>
+            </a:r>
+          </a:p>
+          <a:p>
+            <a:pPr algn="r" rtl="1"/>
+            <a:r>
+              <a:rPr lang="fa-IR" b="0" i="0" dirty="0">
+                <a:solidFill>
+                  <a:srgbClr val="3C4043"/>
+                </a:solidFill>
+                <a:effectLst/>
+                <a:latin typeface="Roboto" panose="02000000000000000000" pitchFamily="2" charset="0"/>
+              </a:rPr>
+              <a:t>-در اینجا اندازه کش 8 (23) =&gt; 3 بیت برای شاخص است</a:t>
+            </a:r>
+          </a:p>
+          <a:p>
+            <a:pPr algn="r" rtl="1"/>
+            <a:r>
+              <a:rPr lang="fa-IR" b="0" i="0" dirty="0">
+                <a:solidFill>
+                  <a:srgbClr val="3C4043"/>
+                </a:solidFill>
+                <a:effectLst/>
+                <a:latin typeface="Roboto" panose="02000000000000000000" pitchFamily="2" charset="0"/>
+              </a:rPr>
+              <a:t>-2 بیت برای برچسب</a:t>
+            </a:r>
           </a:p>
         </p:txBody>
       </p:sp>
@@ -9683,7 +9712,7 @@
         <p:spPr>
           <a:xfrm>
             <a:off x="65313" y="846167"/>
-            <a:ext cx="4366727" cy="3416320"/>
+            <a:ext cx="4366727" cy="3139321"/>
           </a:xfrm>
           <a:prstGeom prst="rect">
             <a:avLst/>
@@ -9695,15 +9724,6 @@
             <a:spAutoFit/>
           </a:bodyPr>
           <a:lstStyle/>
-          <a:p>
-            <a:pPr algn="l"/>
-            <a:endParaRPr lang="en-US" sz="1800" b="0" i="0" u="none" strike="noStrike" baseline="0" dirty="0">
-              <a:solidFill>
-                <a:srgbClr val="000000"/>
-              </a:solidFill>
-              <a:latin typeface="Arial" panose="020B0604020202020204" pitchFamily="34" charset="0"/>
-            </a:endParaRPr>
-          </a:p>
           <a:p>
             <a:r>
               <a:rPr lang="en-US" sz="1800" b="0" i="0" u="none" strike="noStrike" baseline="0" dirty="0">
@@ -11282,8 +11302,8 @@
         </p:nvSpPr>
         <p:spPr>
           <a:xfrm>
-            <a:off x="4665307" y="1097322"/>
-            <a:ext cx="4156787" cy="1477328"/>
+            <a:off x="4595328" y="843677"/>
+            <a:ext cx="4483359" cy="2585323"/>
           </a:xfrm>
           <a:prstGeom prst="rect">
             <a:avLst/>
@@ -11305,37 +11325,43 @@
                 <a:effectLst/>
                 <a:latin typeface="Roboto" panose="02000000000000000000" pitchFamily="2" charset="0"/>
               </a:rPr>
-              <a:t>32 بیت آدرس بایت• 2 بیت کم اهمیت آدرس کلمه هستند• حافظه پنهان به اندازه 2</a:t>
-            </a:r>
-            <a:r>
-              <a:rPr lang="en-US" b="0" i="0" dirty="0" err="1">
+              <a:t>32 بیت آدرس بایت</a:t>
+            </a:r>
+          </a:p>
+          <a:p>
+            <a:pPr algn="r" rtl="1"/>
+            <a:r>
+              <a:rPr lang="fa-IR" b="0" i="0" dirty="0">
                 <a:solidFill>
                   <a:srgbClr val="3C4043"/>
                 </a:solidFill>
                 <a:effectLst/>
                 <a:latin typeface="Roboto" panose="02000000000000000000" pitchFamily="2" charset="0"/>
               </a:rPr>
-              <a:t>nword</a:t>
-            </a:r>
-            <a:r>
-              <a:rPr lang="en-US" b="0" i="0" dirty="0">
+              <a:t>• 2 بیت کم اهمیت آدرس کلمه هستند</a:t>
+            </a:r>
+          </a:p>
+          <a:p>
+            <a:pPr algn="r" rtl="1"/>
+            <a:r>
+              <a:rPr lang="fa-IR" b="0" i="0" dirty="0">
                 <a:solidFill>
                   <a:srgbClr val="3C4043"/>
                 </a:solidFill>
                 <a:effectLst/>
                 <a:latin typeface="Roboto" panose="02000000000000000000" pitchFamily="2" charset="0"/>
               </a:rPr>
-              <a:t> </a:t>
-            </a:r>
-            <a:r>
-              <a:rPr lang="fa-IR" b="0" i="0" dirty="0">
+              <a:t>• حافظه پنهان به اندازه 2</a:t>
+            </a:r>
+            <a:r>
+              <a:rPr lang="en-US" b="0" i="0" dirty="0" err="1">
                 <a:solidFill>
                   <a:srgbClr val="3C4043"/>
                 </a:solidFill>
                 <a:effectLst/>
                 <a:latin typeface="Roboto" panose="02000000000000000000" pitchFamily="2" charset="0"/>
               </a:rPr>
-              <a:t>با بلوک های یک کلمه (4 بایت) نیاز دارد</a:t>
+              <a:t>nword</a:t>
             </a:r>
             <a:r>
               <a:rPr lang="en-US" b="0" i="0" dirty="0">
@@ -11345,7 +11371,7 @@
                 <a:effectLst/>
                 <a:latin typeface="Roboto" panose="02000000000000000000" pitchFamily="2" charset="0"/>
               </a:rPr>
-              <a:t>n </a:t>
+              <a:t> </a:t>
             </a:r>
             <a:r>
               <a:rPr lang="fa-IR" b="0" i="0" dirty="0">
@@ -11355,8 +11381,11 @@
                 <a:effectLst/>
                 <a:latin typeface="Roboto" panose="02000000000000000000" pitchFamily="2" charset="0"/>
               </a:rPr>
-              <a:t>بیت شاخصیک فیلد برچسب به اندازه 32-(</a:t>
-            </a:r>
+              <a:t>با بلوک های یک کلمه (4 بایت) نیاز دارد</a:t>
+            </a:r>
+          </a:p>
+          <a:p>
+            <a:pPr algn="r" rtl="1"/>
             <a:r>
               <a:rPr lang="en-US" b="0" i="0" dirty="0">
                 <a:solidFill>
@@ -11365,7 +11394,7 @@
                 <a:effectLst/>
                 <a:latin typeface="Roboto" panose="02000000000000000000" pitchFamily="2" charset="0"/>
               </a:rPr>
-              <a:t>n+2) </a:t>
+              <a:t>n </a:t>
             </a:r>
             <a:r>
               <a:rPr lang="fa-IR" b="0" i="0" dirty="0">
@@ -11375,17 +11404,20 @@
                 <a:effectLst/>
                 <a:latin typeface="Roboto" panose="02000000000000000000" pitchFamily="2" charset="0"/>
               </a:rPr>
-              <a:t>بیت1 بیت برای معتبر  تعداد بیت ها در حافظه نهان</a:t>
-            </a:r>
-            <a:r>
-              <a:rPr lang="en-US" b="0" i="0" dirty="0">
+              <a:t>بیت شاخص</a:t>
+            </a:r>
+          </a:p>
+          <a:p>
+            <a:pPr algn="r" rtl="1"/>
+            <a:r>
+              <a:rPr lang="fa-IR" b="0" i="0" dirty="0">
                 <a:solidFill>
                   <a:srgbClr val="3C4043"/>
                 </a:solidFill>
                 <a:effectLst/>
                 <a:latin typeface="Roboto" panose="02000000000000000000" pitchFamily="2" charset="0"/>
               </a:rPr>
-              <a:t>look aside </a:t>
+              <a:t>یک فیلد برچسب به اندازه 32-(</a:t>
             </a:r>
             <a:r>
               <a:rPr lang="en-US" b="0" i="0" dirty="0">
@@ -11394,19 +11426,67 @@
                 </a:solidFill>
                 <a:effectLst/>
                 <a:latin typeface="Roboto" panose="02000000000000000000" pitchFamily="2" charset="0"/>
-                <a:sym typeface="Wingdings" panose="05000000000000000000" pitchFamily="2" charset="2"/>
-              </a:rPr>
-              <a:t></a:t>
-            </a:r>
-            <a:r>
-              <a:rPr lang="en-US" b="0" i="0" dirty="0">
+              </a:rPr>
+              <a:t>n+2) </a:t>
+            </a:r>
+            <a:r>
+              <a:rPr lang="fa-IR" b="0" i="0" dirty="0">
                 <a:solidFill>
                   <a:srgbClr val="3C4043"/>
                 </a:solidFill>
                 <a:effectLst/>
                 <a:latin typeface="Roboto" panose="02000000000000000000" pitchFamily="2" charset="0"/>
               </a:rPr>
-              <a:t>:</a:t>
+              <a:t>بیت</a:t>
+            </a:r>
+          </a:p>
+          <a:p>
+            <a:pPr algn="r" rtl="1"/>
+            <a:r>
+              <a:rPr lang="fa-IR" b="0" i="0" dirty="0">
+                <a:solidFill>
+                  <a:srgbClr val="3C4043"/>
+                </a:solidFill>
+                <a:effectLst/>
+                <a:latin typeface="Roboto" panose="02000000000000000000" pitchFamily="2" charset="0"/>
+              </a:rPr>
+              <a:t>1 بیت برای معتبر</a:t>
+            </a:r>
+          </a:p>
+          <a:p>
+            <a:pPr algn="r" rtl="1"/>
+            <a:r>
+              <a:rPr lang="fa-IR" b="0" i="0" dirty="0">
+                <a:solidFill>
+                  <a:srgbClr val="3C4043"/>
+                </a:solidFill>
+                <a:effectLst/>
+                <a:latin typeface="Roboto" panose="02000000000000000000" pitchFamily="2" charset="0"/>
+              </a:rPr>
+              <a:t>  تعداد بیت ها در حافظه نهان =</a:t>
+            </a:r>
+          </a:p>
+          <a:p>
+            <a:pPr algn="r" rtl="1"/>
+            <a:r>
+              <a:rPr lang="fa-IR" b="0" i="0" dirty="0">
+                <a:solidFill>
+                  <a:srgbClr val="3C4043"/>
+                </a:solidFill>
+                <a:effectLst/>
+                <a:latin typeface="Roboto" panose="02000000000000000000" pitchFamily="2" charset="0"/>
+              </a:rPr>
+              <a:t>2</a:t>
+            </a:r>
+            <a:r>
+              <a:rPr lang="en-US" b="0" i="0" dirty="0">
+                <a:solidFill>
+                  <a:srgbClr val="3C4043"/>
+                </a:solidFill>
+                <a:effectLst/>
+                <a:latin typeface="Roboto" panose="02000000000000000000" pitchFamily="2" charset="0"/>
+              </a:rPr>
+              <a:t>n x (32+(32-n-2)+1)=2nx (63-n)</a:t>
             </a:r>
             <a:endParaRPr lang="fa-IR" b="0" i="0" dirty="0">
               <a:solidFill>
@@ -12115,8 +12195,8 @@
         </p:nvSpPr>
         <p:spPr>
           <a:xfrm>
-            <a:off x="4665307" y="1097322"/>
-            <a:ext cx="4156787" cy="4801314"/>
+            <a:off x="4688633" y="846167"/>
+            <a:ext cx="4455367" cy="4247317"/>
           </a:xfrm>
           <a:prstGeom prst="rect">
             <a:avLst/>
@@ -12138,7 +12218,7 @@
                 <a:effectLst/>
                 <a:latin typeface="Roboto" panose="02000000000000000000" pitchFamily="2" charset="0"/>
               </a:rPr>
-              <a:t>• کش خواندن ضربه: هیچ اقدام مورد نیاز است• حافظه پنهان دستورالعمل از دست رفته:</a:t>
+              <a:t>• کش خواندن ضربه: هیچ اقدام مورد نیاز است</a:t>
             </a:r>
           </a:p>
           <a:p>
@@ -12151,51 +12231,51 @@
                 <a:effectLst/>
                 <a:latin typeface="Roboto" panose="02000000000000000000" pitchFamily="2" charset="0"/>
               </a:rPr>
-              <a:t>1.ارسال مقدار اصلی </a:t>
-            </a:r>
-            <a:r>
-              <a:rPr lang="en-US" b="0" i="0" dirty="0">
+              <a:t>• حافظه پنهان دستورالعمل از دست رفته:</a:t>
+            </a:r>
+          </a:p>
+          <a:p>
+            <a:pPr algn="r" rtl="1"/>
+            <a:r>
+              <a:rPr lang="fa-IR" b="0" i="0" dirty="0">
                 <a:solidFill>
                   <a:srgbClr val="3C4043"/>
                 </a:solidFill>
                 <a:effectLst/>
                 <a:latin typeface="Roboto" panose="02000000000000000000" pitchFamily="2" charset="0"/>
               </a:rPr>
-              <a:t>PC (PC </a:t>
-            </a:r>
-            <a:r>
-              <a:rPr lang="fa-IR" b="0" i="0" dirty="0">
+              <a:t>1.ارسال مقدار اصلی </a:t>
+            </a:r>
+            <a:r>
+              <a:rPr lang="en-US" b="0" i="0" dirty="0">
                 <a:solidFill>
                   <a:srgbClr val="3C4043"/>
                 </a:solidFill>
                 <a:effectLst/>
                 <a:latin typeface="Roboto" panose="02000000000000000000" pitchFamily="2" charset="0"/>
               </a:rPr>
-              <a:t>فعلی -4، زیرا </a:t>
-            </a:r>
-            <a:r>
-              <a:rPr lang="en-US" b="0" i="0" dirty="0">
+              <a:t>PC (PC </a:t>
+            </a:r>
+            <a:r>
+              <a:rPr lang="fa-IR" b="0" i="0" dirty="0">
                 <a:solidFill>
                   <a:srgbClr val="3C4043"/>
                 </a:solidFill>
                 <a:effectLst/>
                 <a:latin typeface="Roboto" panose="02000000000000000000" pitchFamily="2" charset="0"/>
               </a:rPr>
-              <a:t>PC </a:t>
-            </a:r>
-            <a:r>
-              <a:rPr lang="fa-IR" b="0" i="0" dirty="0">
+              <a:t>فعلی -4، زیرا </a:t>
+            </a:r>
+            <a:r>
+              <a:rPr lang="en-US" b="0" i="0" dirty="0">
                 <a:solidFill>
                   <a:srgbClr val="3C4043"/>
                 </a:solidFill>
                 <a:effectLst/>
                 <a:latin typeface="Roboto" panose="02000000000000000000" pitchFamily="2" charset="0"/>
               </a:rPr>
-              <a:t>قبلاً در مرحله اول چرخه دستورالعمل افزایش یافته است) به حافظه2</a:t>
-            </a:r>
-          </a:p>
-          <a:p>
-            <a:pPr algn="r" rtl="1"/>
+              <a:t>PC </a:t>
+            </a:r>
             <a:r>
               <a:rPr lang="fa-IR" b="0" i="0" dirty="0">
                 <a:solidFill>
@@ -12204,27 +12284,21 @@
                 <a:effectLst/>
                 <a:latin typeface="Roboto" panose="02000000000000000000" pitchFamily="2" charset="0"/>
               </a:rPr>
-              <a:t>. به حافظه اصلی دستور دهید تا خواندن را انجام دهد و منتظر بمانید تا حافظه کامل شود - </a:t>
-            </a:r>
-            <a:r>
-              <a:rPr lang="en-US" b="0" i="0" dirty="0">
+              <a:t>قبلاً در مرحله اول چرخه دستورالعمل افزایش یافته است) به حافظه</a:t>
+            </a:r>
+          </a:p>
+          <a:p>
+            <a:pPr algn="r" rtl="1"/>
+            <a:r>
+              <a:rPr lang="fa-IR" b="0" i="0" dirty="0">
                 <a:solidFill>
                   <a:srgbClr val="3C4043"/>
                 </a:solidFill>
                 <a:effectLst/>
                 <a:latin typeface="Roboto" panose="02000000000000000000" pitchFamily="2" charset="0"/>
               </a:rPr>
-              <a:t>stall on </a:t>
-            </a:r>
-            <a:endParaRPr lang="fa-IR" dirty="0">
-              <a:solidFill>
-                <a:srgbClr val="3C4043"/>
-              </a:solidFill>
-              <a:latin typeface="Roboto" panose="02000000000000000000" pitchFamily="2" charset="0"/>
-            </a:endParaRPr>
-          </a:p>
-          <a:p>
-            <a:pPr algn="r" rtl="1"/>
+              <a:t>2. به حافظه اصلی دستور دهید تا خواندن را انجام دهد و منتظر بمانید تا حافظه کامل شود - </a:t>
+            </a:r>
             <a:r>
               <a:rPr lang="en-US" b="0" i="0" dirty="0">
                 <a:solidFill>
@@ -12233,51 +12307,51 @@
                 <a:effectLst/>
                 <a:latin typeface="Roboto" panose="02000000000000000000" pitchFamily="2" charset="0"/>
               </a:rPr>
-              <a:t>Read3. </a:t>
-            </a:r>
-            <a:r>
-              <a:rPr lang="fa-IR" b="0" i="0" dirty="0">
+              <a:t>stall on read</a:t>
+            </a:r>
+          </a:p>
+          <a:p>
+            <a:pPr algn="r" rtl="1"/>
+            <a:r>
+              <a:rPr lang="en-US" b="0" i="0" dirty="0">
                 <a:solidFill>
                   <a:srgbClr val="3C4043"/>
                 </a:solidFill>
                 <a:effectLst/>
                 <a:latin typeface="Roboto" panose="02000000000000000000" pitchFamily="2" charset="0"/>
               </a:rPr>
-              <a:t>پس از اتمام خواندن، </a:t>
-            </a:r>
-            <a:r>
-              <a:rPr lang="en-US" b="0" i="0" dirty="0" err="1">
+              <a:t>3. </a:t>
+            </a:r>
+            <a:r>
+              <a:rPr lang="fa-IR" b="0" i="0" dirty="0">
                 <a:solidFill>
                   <a:srgbClr val="3C4043"/>
                 </a:solidFill>
                 <a:effectLst/>
                 <a:latin typeface="Roboto" panose="02000000000000000000" pitchFamily="2" charset="0"/>
               </a:rPr>
-              <a:t>cacheentry</a:t>
-            </a:r>
-            <a:r>
-              <a:rPr lang="en-US" b="0" i="0" dirty="0">
+              <a:t>پس از اتمام خواندن، </a:t>
+            </a:r>
+            <a:r>
+              <a:rPr lang="en-US" b="0" i="0" dirty="0" err="1">
                 <a:solidFill>
                   <a:srgbClr val="3C4043"/>
                 </a:solidFill>
                 <a:effectLst/>
                 <a:latin typeface="Roboto" panose="02000000000000000000" pitchFamily="2" charset="0"/>
               </a:rPr>
-              <a:t> </a:t>
-            </a:r>
-            <a:r>
-              <a:rPr lang="fa-IR" b="0" i="0" dirty="0">
+              <a:t>cacheentry</a:t>
+            </a:r>
+            <a:r>
+              <a:rPr lang="en-US" b="0" i="0" dirty="0">
                 <a:solidFill>
                   <a:srgbClr val="3C4043"/>
                 </a:solidFill>
                 <a:effectLst/>
                 <a:latin typeface="Roboto" panose="02000000000000000000" pitchFamily="2" charset="0"/>
               </a:rPr>
-              <a:t>را بنویسید</a:t>
-            </a:r>
-          </a:p>
-          <a:p>
-            <a:pPr algn="r" rtl="1"/>
+              <a:t> </a:t>
+            </a:r>
             <a:r>
               <a:rPr lang="fa-IR" b="0" i="0" dirty="0">
                 <a:solidFill>
@@ -12286,7 +12360,7 @@
                 <a:effectLst/>
                 <a:latin typeface="Roboto" panose="02000000000000000000" pitchFamily="2" charset="0"/>
               </a:rPr>
-              <a:t>4. اجرای دستور را مجدداً در مرحله اول برای بازیابی مجدد دستورالعمل شروع کنید</a:t>
+              <a:t>را بنویسید</a:t>
             </a:r>
           </a:p>
           <a:p>
@@ -12299,7 +12373,7 @@
                 <a:effectLst/>
                 <a:latin typeface="Roboto" panose="02000000000000000000" pitchFamily="2" charset="0"/>
               </a:rPr>
-              <a:t>• حافظه پنهان داده از دست رفته:</a:t>
+              <a:t>4. اجرای دستور را مجدداً در مرحله اول برای بازیابی مجدد دستورالعمل شروع کنید</a:t>
             </a:r>
           </a:p>
           <a:p>
@@ -12312,28 +12386,44 @@
                 <a:effectLst/>
                 <a:latin typeface="Roboto" panose="02000000000000000000" pitchFamily="2" charset="0"/>
               </a:rPr>
-              <a:t>-شبیه به دستورالعمل </a:t>
-            </a:r>
-            <a:r>
-              <a:rPr lang="en-US" b="0" i="0" dirty="0">
+              <a:t>• حافظه پنهان داده از دست رفته:</a:t>
+            </a:r>
+          </a:p>
+          <a:p>
+            <a:pPr algn="r" rtl="1"/>
+            <a:r>
+              <a:rPr lang="fa-IR" b="0" i="0" dirty="0">
                 <a:solidFill>
                   <a:srgbClr val="3C4043"/>
                 </a:solidFill>
                 <a:effectLst/>
                 <a:latin typeface="Roboto" panose="02000000000000000000" pitchFamily="2" charset="0"/>
               </a:rPr>
-              <a:t>miss cache- </a:t>
-            </a:r>
-            <a:endParaRPr lang="fa-IR" b="0" i="0" dirty="0">
-              <a:solidFill>
-                <a:srgbClr val="3C4043"/>
-              </a:solidFill>
-              <a:effectLst/>
-              <a:latin typeface="Roboto" panose="02000000000000000000" pitchFamily="2" charset="0"/>
-            </a:endParaRPr>
+              <a:t>-شبیه به دستورالعمل </a:t>
+            </a:r>
+            <a:r>
+              <a:rPr lang="en-US" b="0" i="0" dirty="0">
+                <a:solidFill>
+                  <a:srgbClr val="3C4043"/>
+                </a:solidFill>
+                <a:effectLst/>
+                <a:latin typeface="Roboto" panose="02000000000000000000" pitchFamily="2" charset="0"/>
+              </a:rPr>
+              <a:t>miss cache</a:t>
+            </a:r>
           </a:p>
           <a:p>
             <a:pPr algn="r" rtl="1"/>
+            <a:r>
+              <a:rPr lang="en-US" b="0" i="0" dirty="0">
+                <a:solidFill>
+                  <a:srgbClr val="3C4043"/>
+                </a:solidFill>
+                <a:effectLst/>
+                <a:latin typeface="Roboto" panose="02000000000000000000" pitchFamily="2" charset="0"/>
+              </a:rPr>
+              <a:t>- </a:t>
+            </a:r>
             <a:r>
               <a:rPr lang="fa-IR" b="0" i="0" dirty="0">
                 <a:solidFill>
@@ -12449,8 +12539,8 @@
         </p:nvSpPr>
         <p:spPr>
           <a:xfrm>
-            <a:off x="65313" y="846167"/>
-            <a:ext cx="4366727" cy="5078313"/>
+            <a:off x="1" y="846167"/>
+            <a:ext cx="4432040" cy="4524315"/>
           </a:xfrm>
           <a:prstGeom prst="rect">
             <a:avLst/>
@@ -12462,15 +12552,6 @@
             <a:spAutoFit/>
           </a:bodyPr>
           <a:lstStyle/>
-          <a:p>
-            <a:pPr algn="l"/>
-            <a:endParaRPr lang="en-US" sz="1800" b="0" i="0" u="none" strike="noStrike" baseline="0" dirty="0">
-              <a:solidFill>
-                <a:srgbClr val="000000"/>
-              </a:solidFill>
-              <a:latin typeface="Arial" panose="020B0604020202020204" pitchFamily="34" charset="0"/>
-            </a:endParaRPr>
-          </a:p>
           <a:p>
             <a:r>
               <a:rPr lang="en-US" sz="1800" b="0" i="0" u="none" strike="noStrike" baseline="0" dirty="0">
@@ -13026,8 +13107,8 @@
         </p:nvSpPr>
         <p:spPr>
           <a:xfrm>
-            <a:off x="4665307" y="569167"/>
-            <a:ext cx="4156787" cy="6186309"/>
+            <a:off x="4567333" y="569167"/>
+            <a:ext cx="4576668" cy="6186309"/>
           </a:xfrm>
           <a:prstGeom prst="rect">
             <a:avLst/>
@@ -13159,10 +13240,7 @@
             </a:r>
           </a:p>
           <a:p>
-            <a:pPr marL="285750" indent="-285750" algn="r" rtl="1">
-              <a:buFontTx/>
-              <a:buChar char="-"/>
-            </a:pPr>
+            <a:pPr algn="r" rtl="1"/>
             <a:r>
               <a:rPr lang="fa-IR" b="0" i="0" dirty="0">
                 <a:solidFill>
@@ -13171,14 +13249,11 @@
                 <a:effectLst/>
                 <a:latin typeface="Roboto" panose="02000000000000000000" pitchFamily="2" charset="0"/>
               </a:rPr>
-              <a:t>نوشتن از طریق به دلیل نوشتن حافظه همیشه مورد نیاز، کند است•</a:t>
-            </a:r>
-          </a:p>
-          <a:p>
-            <a:pPr marL="285750" indent="-285750" algn="r" rtl="1">
-              <a:buFontTx/>
-              <a:buChar char="-"/>
-            </a:pPr>
+              <a:t>- نوشتن از طریق به دلیل نوشتن حافظه همیشه مورد نیاز، کند است</a:t>
+            </a:r>
+          </a:p>
+          <a:p>
+            <a:pPr algn="r" rtl="1"/>
             <a:r>
               <a:rPr lang="fa-IR" b="0" i="0" dirty="0">
                 <a:solidFill>
@@ -13187,34 +13262,31 @@
                 <a:effectLst/>
                 <a:latin typeface="Roboto" panose="02000000000000000000" pitchFamily="2" charset="0"/>
               </a:rPr>
-              <a:t>عملکرد با یک بافر نوشتن بهبود می‌یابد، جایی که کلمات در حین انتظار برای نوشتن در حافظه ذخیره می‌شوند - پردازنده می‌تواند تا زمانی که بافر نوشتن پر شود به اجرا ادامه دهد.•وقتی کلمه ای در بافر نوشتن در </a:t>
-            </a:r>
-            <a:r>
-              <a:rPr lang="en-US" b="0" i="0" dirty="0">
+              <a:t>•عملکرد با یک بافر نوشتن بهبود می‌یابد، جایی که کلمات در حین انتظار برای نوشتن در حافظه ذخیره می‌شوند - پردازنده می‌تواند تا زمانی که بافر نوشتن پر شود به اجرا ادامه دهد.</a:t>
+            </a:r>
+          </a:p>
+          <a:p>
+            <a:pPr algn="r" rtl="1"/>
+            <a:r>
+              <a:rPr lang="fa-IR" b="0" i="0" dirty="0">
                 <a:solidFill>
                   <a:srgbClr val="3C4043"/>
                 </a:solidFill>
                 <a:effectLst/>
                 <a:latin typeface="Roboto" panose="02000000000000000000" pitchFamily="2" charset="0"/>
               </a:rPr>
-              <a:t>main </a:t>
-            </a:r>
-            <a:r>
-              <a:rPr lang="fa-IR" b="0" i="0" dirty="0">
+              <a:t>•وقتی کلمه ای در بافر نوشتن در </a:t>
+            </a:r>
+            <a:r>
+              <a:rPr lang="en-US" b="0" i="0" dirty="0">
                 <a:solidFill>
                   <a:srgbClr val="3C4043"/>
                 </a:solidFill>
                 <a:effectLst/>
                 <a:latin typeface="Roboto" panose="02000000000000000000" pitchFamily="2" charset="0"/>
               </a:rPr>
-              <a:t>کامل می شود، آن شکاف بافر آزاد می شود و برای نوشتن های آینده در دسترس می شود.</a:t>
-            </a:r>
-          </a:p>
-          <a:p>
-            <a:pPr marL="285750" indent="-285750" algn="r" rtl="1">
-              <a:buFontTx/>
-              <a:buChar char="-"/>
-            </a:pPr>
+              <a:t>main </a:t>
+            </a:r>
             <a:r>
               <a:rPr lang="fa-IR" b="0" i="0" dirty="0">
                 <a:solidFill>
@@ -13223,31 +13295,31 @@
                 <a:effectLst/>
                 <a:latin typeface="Roboto" panose="02000000000000000000" pitchFamily="2" charset="0"/>
               </a:rPr>
-              <a:t>• بافر نوشتن </a:t>
-            </a:r>
-            <a:r>
-              <a:rPr lang="en-US" b="0" i="0" dirty="0">
+              <a:t>کامل می شود، آن شکاف بافر آزاد می شود و برای نوشتن های آینده در دسترس می شود.</a:t>
+            </a:r>
+          </a:p>
+          <a:p>
+            <a:pPr algn="r" rtl="1"/>
+            <a:r>
+              <a:rPr lang="fa-IR" b="0" i="0" dirty="0">
                 <a:solidFill>
                   <a:srgbClr val="3C4043"/>
                 </a:solidFill>
                 <a:effectLst/>
                 <a:latin typeface="Roboto" panose="02000000000000000000" pitchFamily="2" charset="0"/>
               </a:rPr>
-              <a:t>DEC 3100 </a:t>
-            </a:r>
-            <a:r>
-              <a:rPr lang="fa-IR" b="0" i="0" dirty="0">
+              <a:t>• بافر نوشتن </a:t>
+            </a:r>
+            <a:r>
+              <a:rPr lang="en-US" b="0" i="0" dirty="0">
                 <a:solidFill>
                   <a:srgbClr val="3C4043"/>
                 </a:solidFill>
                 <a:effectLst/>
                 <a:latin typeface="Roboto" panose="02000000000000000000" pitchFamily="2" charset="0"/>
               </a:rPr>
-              <a:t>دارای 4 کلمه است• نوشتن پشت طرح</a:t>
-            </a:r>
-          </a:p>
-          <a:p>
-            <a:pPr algn="r" rtl="1"/>
+              <a:t>DEC 3100 </a:t>
+            </a:r>
             <a:r>
               <a:rPr lang="fa-IR" b="0" i="0" dirty="0">
                 <a:solidFill>
@@ -13256,7 +13328,46 @@
                 <a:effectLst/>
                 <a:latin typeface="Roboto" panose="02000000000000000000" pitchFamily="2" charset="0"/>
               </a:rPr>
-              <a:t>- بلوک داده را فقط در حافظه پنهان بنویسید و فقط زمانی که در حافظه نهان جایگزین شده است، بلوک را به اصلی بنویسید.- کارآمدتر از نوشتن از طریق، پیچیده تر برای پیاده سازی</a:t>
+              <a:t>دارای 4 کلمه است</a:t>
+            </a:r>
+          </a:p>
+          <a:p>
+            <a:pPr algn="r" rtl="1"/>
+            <a:r>
+              <a:rPr lang="fa-IR" b="0" i="0" dirty="0">
+                <a:solidFill>
+                  <a:srgbClr val="3C4043"/>
+                </a:solidFill>
+                <a:effectLst/>
+                <a:latin typeface="Roboto" panose="02000000000000000000" pitchFamily="2" charset="0"/>
+              </a:rPr>
+              <a:t>• نوشتن پشت طرح</a:t>
+            </a:r>
+          </a:p>
+          <a:p>
+            <a:pPr algn="r" rtl="1"/>
+            <a:r>
+              <a:rPr lang="fa-IR" b="0" i="0" dirty="0">
+                <a:solidFill>
+                  <a:srgbClr val="3C4043"/>
+                </a:solidFill>
+                <a:effectLst/>
+                <a:latin typeface="Roboto" panose="02000000000000000000" pitchFamily="2" charset="0"/>
+              </a:rPr>
+              <a:t>- بلوک داده را فقط در حافظه پنهان بنویسید و فقط زمانی که در حافظه نهان جایگزین شده است، بلوک را به اصلی بنویسید.</a:t>
+            </a:r>
+          </a:p>
+          <a:p>
+            <a:pPr algn="r" rtl="1"/>
+            <a:r>
+              <a:rPr lang="fa-IR" b="0" i="0" dirty="0">
+                <a:solidFill>
+                  <a:srgbClr val="3C4043"/>
+                </a:solidFill>
+                <a:effectLst/>
+                <a:latin typeface="Roboto" panose="02000000000000000000" pitchFamily="2" charset="0"/>
+              </a:rPr>
+              <a:t>- کارآمدتر از نوشتن از طریق، پیچیده تر برای پیاده سازی</a:t>
             </a:r>
           </a:p>
         </p:txBody>
@@ -13940,7 +14051,7 @@
         <p:spPr>
           <a:xfrm>
             <a:off x="4861249" y="867747"/>
-            <a:ext cx="4156787" cy="3139321"/>
+            <a:ext cx="4156787" cy="3970318"/>
           </a:xfrm>
           <a:prstGeom prst="rect">
             <a:avLst/>
@@ -13960,15 +14071,43 @@
             </a:r>
             <a:r>
               <a:rPr lang="fa-IR" dirty="0"/>
-              <a:t>حافظه دسترسی تصادفی پویا):- مقدار به عنوان شارژ در خازن ذخیره می شود که باید به طور دوره ای تجدید شود، به همین دلیل است که به آن پویا می گویند.- بسیار کوچک - 1 ترانزیستور در هر بیت - اما ضریب 5 تا 10 کندتر از </a:t>
+              <a:t>حافظه دسترسی تصادفی پویا):</a:t>
+            </a:r>
+          </a:p>
+          <a:p>
+            <a:pPr algn="r" rtl="1"/>
+            <a:r>
+              <a:rPr lang="fa-IR" dirty="0"/>
+              <a:t>- مقدار به عنوان شارژ در خازن ذخیره می شود که باید به طور دوره ای تجدید شود، به همین دلیل است که به آن پویا می گویند.</a:t>
+            </a:r>
+          </a:p>
+          <a:p>
+            <a:pPr algn="r" rtl="1"/>
+            <a:r>
+              <a:rPr lang="fa-IR" dirty="0"/>
+              <a:t>- بسیار کوچک - 1 ترانزیستور در هر بیت - اما ضریب 5 تا 10 کندتر از </a:t>
             </a:r>
             <a:r>
               <a:rPr lang="en-US" dirty="0"/>
-              <a:t>SRAM– </a:t>
+              <a:t>SRAM</a:t>
+            </a:r>
+          </a:p>
+          <a:p>
+            <a:pPr algn="r" rtl="1"/>
+            <a:r>
+              <a:rPr lang="en-US" dirty="0"/>
+              <a:t>– </a:t>
             </a:r>
             <a:r>
               <a:rPr lang="fa-IR" dirty="0"/>
-              <a:t>از حافظه فرمین استفاده شده•</a:t>
+              <a:t>از حافظه فرمین استفاده شده</a:t>
+            </a:r>
+          </a:p>
+          <a:p>
+            <a:pPr algn="r" rtl="1"/>
+            <a:r>
+              <a:rPr lang="fa-IR" dirty="0"/>
+              <a:t>•</a:t>
             </a:r>
             <a:r>
               <a:rPr lang="en-US" dirty="0"/>
@@ -13976,7 +14115,21 @@
             </a:r>
             <a:r>
               <a:rPr lang="fa-IR" dirty="0"/>
-              <a:t>حافظه دسترسی تصادفی استاتیک):- تا زمانی که قدرت وجود داشته باشد به طور نامحدود وجود خواهد داشت، به همین دلیل است که به آن ایستا می گویند- بسیار سریع اما فضای بیشتری را نسبت به </a:t>
+              <a:t>حافظه دسترسی تصادفی استاتیک):</a:t>
+            </a:r>
+          </a:p>
+          <a:p>
+            <a:pPr algn="r" rtl="1"/>
+            <a:r>
+              <a:rPr lang="fa-IR" dirty="0"/>
+              <a:t>- تا زمانی که قدرت وجود داشته باشد به طور نامحدود وجود خواهد داشت، به همین دلیل است که به آن ایستا می گویند</a:t>
+            </a:r>
+          </a:p>
+          <a:p>
+            <a:pPr algn="r" rtl="1"/>
+            <a:r>
+              <a:rPr lang="fa-IR" dirty="0"/>
+              <a:t>- بسیار سریع اما فضای بیشتری را نسبت به </a:t>
             </a:r>
             <a:r>
               <a:rPr lang="en-US" dirty="0"/>
@@ -13984,7 +14137,14 @@
             </a:r>
             <a:r>
               <a:rPr lang="fa-IR" dirty="0"/>
-              <a:t>اشغال می کند - 4 تا 6 ترانزیستور در هر بیت- برای کش استفاده می شود</a:t>
+              <a:t>اشغال می کند - 4 تا 6 ترانزیستور در هر بیت</a:t>
+            </a:r>
+          </a:p>
+          <a:p>
+            <a:pPr algn="r" rtl="1"/>
+            <a:r>
+              <a:rPr lang="fa-IR" dirty="0"/>
+              <a:t>- برای کش استفاده می شود</a:t>
             </a:r>
             <a:endParaRPr lang="en-US" dirty="0"/>
           </a:p>
@@ -14100,7 +14260,7 @@
         </p:blipFill>
         <p:spPr>
           <a:xfrm>
-            <a:off x="125963" y="4450703"/>
+            <a:off x="125963" y="4450702"/>
             <a:ext cx="4156789" cy="2407298"/>
           </a:xfrm>
           <a:prstGeom prst="rect">
@@ -14362,8 +14522,8 @@
         </p:nvSpPr>
         <p:spPr>
           <a:xfrm>
-            <a:off x="88638" y="636316"/>
-            <a:ext cx="4576669" cy="4247317"/>
+            <a:off x="88638" y="913314"/>
+            <a:ext cx="4576669" cy="3970318"/>
           </a:xfrm>
           <a:prstGeom prst="rect">
             <a:avLst/>
@@ -14375,15 +14535,6 @@
             <a:spAutoFit/>
           </a:bodyPr>
           <a:lstStyle/>
-          <a:p>
-            <a:pPr algn="l"/>
-            <a:endParaRPr lang="en-US" sz="1800" b="0" i="0" u="none" strike="noStrike" baseline="0" dirty="0">
-              <a:solidFill>
-                <a:srgbClr val="000000"/>
-              </a:solidFill>
-              <a:latin typeface="Arial" panose="020B0604020202020204" pitchFamily="34" charset="0"/>
-            </a:endParaRPr>
-          </a:p>
           <a:p>
             <a:r>
               <a:rPr lang="en-US" sz="1800" b="0" i="0" u="none" strike="noStrike" baseline="0" dirty="0">
@@ -15002,7 +15153,7 @@
         </p:blipFill>
         <p:spPr>
           <a:xfrm>
-            <a:off x="1995737" y="3447660"/>
+            <a:off x="2245330" y="3447661"/>
             <a:ext cx="4630011" cy="3350461"/>
           </a:xfrm>
           <a:prstGeom prst="rect">
@@ -18770,13 +18921,6 @@
               </a:rPr>
               <a:t>• نقشه برداری مستقیم: یک مکان کش منحصر به فرد برای هر بلوک حافظه</a:t>
             </a:r>
-            <a:endParaRPr lang="en-US" b="0" i="0" dirty="0">
-              <a:solidFill>
-                <a:srgbClr val="3C4043"/>
-              </a:solidFill>
-              <a:effectLst/>
-              <a:latin typeface="Roboto" panose="02000000000000000000" pitchFamily="2" charset="0"/>
-            </a:endParaRPr>
           </a:p>
           <a:p>
             <a:pPr algn="r" rtl="1"/>
@@ -18790,13 +18934,6 @@
               </a:rPr>
               <a:t>-آدرس بلوک کش = آدرس بلوک حافظه اندازه مود کش</a:t>
             </a:r>
-            <a:endParaRPr lang="en-US" b="0" i="0" dirty="0">
-              <a:solidFill>
-                <a:srgbClr val="3C4043"/>
-              </a:solidFill>
-              <a:effectLst/>
-              <a:latin typeface="Roboto" panose="02000000000000000000" pitchFamily="2" charset="0"/>
-            </a:endParaRPr>
           </a:p>
           <a:p>
             <a:pPr algn="r" rtl="1"/>
@@ -18810,19 +18947,9 @@
               </a:rPr>
               <a:t>• کاملاً ارتباطی: هر بلوک حافظه می تواند هر جایی را در حافظه پنهان قرار دهد</a:t>
             </a:r>
-            <a:endParaRPr lang="en-US" b="0" i="0" dirty="0">
-              <a:solidFill>
-                <a:srgbClr val="3C4043"/>
-              </a:solidFill>
-              <a:effectLst/>
-              <a:latin typeface="Roboto" panose="02000000000000000000" pitchFamily="2" charset="0"/>
-            </a:endParaRPr>
-          </a:p>
-          <a:p>
-            <a:pPr marL="285750" indent="-285750" algn="r" rtl="1">
-              <a:buFontTx/>
-              <a:buChar char="-"/>
-            </a:pPr>
+          </a:p>
+          <a:p>
+            <a:pPr algn="r" rtl="1"/>
             <a:r>
               <a:rPr lang="fa-IR" b="0" i="0" dirty="0">
                 <a:solidFill>
@@ -18831,21 +18958,11 @@
                 <a:effectLst/>
                 <a:latin typeface="Roboto" panose="02000000000000000000" pitchFamily="2" charset="0"/>
               </a:rPr>
-              <a:t>ورودی های حافظه پنهان (به صورت موازی) برای تعیین مکان بلوک جستجو می شوند</a:t>
-            </a:r>
-            <a:endParaRPr lang="en-US" b="0" i="0" dirty="0">
-              <a:solidFill>
-                <a:srgbClr val="3C4043"/>
-              </a:solidFill>
-              <a:effectLst/>
-              <a:latin typeface="Roboto" panose="02000000000000000000" pitchFamily="2" charset="0"/>
-            </a:endParaRPr>
-          </a:p>
-          <a:p>
-            <a:pPr marL="285750" indent="-285750" algn="r" rtl="1">
-              <a:buFontTx/>
-              <a:buChar char="-"/>
-            </a:pPr>
+              <a:t>- ورودی های حافظه پنهان (به صورت موازی) برای تعیین مکان بلوک جستجو می شوند</a:t>
+            </a:r>
+          </a:p>
+          <a:p>
+            <a:pPr algn="r" rtl="1"/>
             <a:r>
               <a:rPr lang="fa-IR" b="0" i="0" dirty="0">
                 <a:solidFill>
@@ -18874,61 +18991,51 @@
                 <a:effectLst/>
                 <a:latin typeface="Roboto" panose="02000000000000000000" pitchFamily="2" charset="0"/>
               </a:rPr>
-              <a:t>هر بلوک حافظه می تواند در یک مجموعه از مکان های کش منحصر به فرد قرار گیرد</a:t>
-            </a:r>
-            <a:endParaRPr lang="en-US" b="0" i="0" dirty="0">
-              <a:solidFill>
-                <a:srgbClr val="3C4043"/>
-              </a:solidFill>
-              <a:effectLst/>
-              <a:latin typeface="Roboto" panose="02000000000000000000" pitchFamily="2" charset="0"/>
-            </a:endParaRPr>
-          </a:p>
-          <a:p>
-            <a:pPr marL="285750" indent="-285750" algn="r" rtl="1">
-              <a:buFontTx/>
-              <a:buChar char="-"/>
-            </a:pPr>
-            <a:r>
-              <a:rPr lang="fa-IR" b="0" i="0" dirty="0">
+              <a:t>هر بلوک حافظه می تواند در یک مجموعه از مکان های کش منحصر به فرد قرار گیرد - اگر مجموعه به اندازه </a:t>
+            </a:r>
+            <a:r>
+              <a:rPr lang="en-US" b="0" i="0" dirty="0">
                 <a:solidFill>
                   <a:srgbClr val="3C4043"/>
                 </a:solidFill>
                 <a:effectLst/>
                 <a:latin typeface="Roboto" panose="02000000000000000000" pitchFamily="2" charset="0"/>
               </a:rPr>
-              <a:t> اگر مجموعه به اندازه </a:t>
-            </a:r>
-            <a:r>
-              <a:rPr lang="en-US" b="0" i="0" dirty="0">
+              <a:t>n </a:t>
+            </a:r>
+            <a:r>
+              <a:rPr lang="fa-IR" b="0" i="0" dirty="0">
                 <a:solidFill>
                   <a:srgbClr val="3C4043"/>
                 </a:solidFill>
                 <a:effectLst/>
                 <a:latin typeface="Roboto" panose="02000000000000000000" pitchFamily="2" charset="0"/>
               </a:rPr>
-              <a:t>n </a:t>
-            </a:r>
-            <a:r>
-              <a:rPr lang="fa-IR" b="0" i="0" dirty="0">
+              <a:t>باشد، </a:t>
+            </a:r>
+            <a:r>
+              <a:rPr lang="en-US" b="0" i="0" dirty="0">
                 <a:solidFill>
                   <a:srgbClr val="3C4043"/>
                 </a:solidFill>
                 <a:effectLst/>
                 <a:latin typeface="Roboto" panose="02000000000000000000" pitchFamily="2" charset="0"/>
               </a:rPr>
-              <a:t>باشد، </a:t>
-            </a:r>
-            <a:r>
-              <a:rPr lang="en-US" b="0" i="0" dirty="0">
+              <a:t>n-way set-associative </a:t>
+            </a:r>
+            <a:r>
+              <a:rPr lang="fa-IR" b="0" i="0" dirty="0">
                 <a:solidFill>
                   <a:srgbClr val="3C4043"/>
                 </a:solidFill>
                 <a:effectLst/>
                 <a:latin typeface="Roboto" panose="02000000000000000000" pitchFamily="2" charset="0"/>
               </a:rPr>
-              <a:t>n-way set-associative </a:t>
-            </a:r>
+              <a:t>است.</a:t>
+            </a:r>
+          </a:p>
+          <a:p>
+            <a:pPr algn="r" rtl="1"/>
             <a:r>
               <a:rPr lang="fa-IR" b="0" i="0" dirty="0">
                 <a:solidFill>
@@ -18937,21 +19044,11 @@
                 <a:effectLst/>
                 <a:latin typeface="Roboto" panose="02000000000000000000" pitchFamily="2" charset="0"/>
               </a:rPr>
-              <a:t>است.-آدرس مجموعه کش = آدرس بلوک حافظه تعداد مجموعه های موجود در کش- تمام ورودی های کش در مجموعه مربوطه جستجو می شوند (به صورت موازی) برای تعیین محل بلوک</a:t>
-            </a:r>
-            <a:endParaRPr lang="en-US" b="0" i="0" dirty="0">
-              <a:solidFill>
-                <a:srgbClr val="3C4043"/>
-              </a:solidFill>
-              <a:effectLst/>
-              <a:latin typeface="Roboto" panose="02000000000000000000" pitchFamily="2" charset="0"/>
-            </a:endParaRPr>
-          </a:p>
-          <a:p>
-            <a:pPr marL="285750" indent="-285750" algn="r" rtl="1">
-              <a:buFontTx/>
-              <a:buChar char="-"/>
-            </a:pPr>
+              <a:t>-آدرس مجموعه کش = آدرس بلوک حافظه تعداد مجموعه های موجود در کش</a:t>
+            </a:r>
+          </a:p>
+          <a:p>
+            <a:pPr algn="r" rtl="1"/>
             <a:r>
               <a:rPr lang="fa-IR" b="0" i="0" dirty="0">
                 <a:solidFill>
@@ -18960,31 +19057,24 @@
                 <a:effectLst/>
                 <a:latin typeface="Roboto" panose="02000000000000000000" pitchFamily="2" charset="0"/>
               </a:rPr>
-              <a:t>•</a:t>
-            </a:r>
-            <a:r>
-              <a:rPr lang="fa-IR" b="1" i="0" dirty="0">
+              <a:t>- تمام ورودی های کش در مجموعه مربوطه جستجو می شوند (به صورت موازی) برای تعیین محل بلوک</a:t>
+            </a:r>
+          </a:p>
+          <a:p>
+            <a:pPr algn="r" rtl="1"/>
+            <a:r>
+              <a:rPr lang="fa-IR" b="0" i="0" dirty="0">
                 <a:solidFill>
                   <a:srgbClr val="3C4043"/>
                 </a:solidFill>
                 <a:effectLst/>
                 <a:latin typeface="Roboto" panose="02000000000000000000" pitchFamily="2" charset="0"/>
               </a:rPr>
-              <a:t>افزایش درجه انجمنی</a:t>
-            </a:r>
-            <a:endParaRPr lang="en-US" b="1" i="0" dirty="0">
-              <a:solidFill>
-                <a:srgbClr val="3C4043"/>
-              </a:solidFill>
-              <a:effectLst/>
-              <a:latin typeface="Roboto" panose="02000000000000000000" pitchFamily="2" charset="0"/>
-            </a:endParaRPr>
-          </a:p>
-          <a:p>
-            <a:pPr marL="285750" indent="-285750" algn="r" rtl="1">
-              <a:buFontTx/>
-              <a:buChar char="-"/>
-            </a:pPr>
+              <a:t>•افزایش درجه انجمنی</a:t>
+            </a:r>
+          </a:p>
+          <a:p>
+            <a:pPr algn="r" rtl="1"/>
             <a:r>
               <a:rPr lang="fa-IR" b="0" i="0" dirty="0">
                 <a:solidFill>
@@ -18993,21 +19083,11 @@
                 <a:effectLst/>
                 <a:latin typeface="Roboto" panose="02000000000000000000" pitchFamily="2" charset="0"/>
               </a:rPr>
-              <a:t>میزان از دست دادن را کاهش می دهد</a:t>
-            </a:r>
-            <a:endParaRPr lang="en-US" b="0" i="0" dirty="0">
-              <a:solidFill>
-                <a:srgbClr val="3C4043"/>
-              </a:solidFill>
-              <a:effectLst/>
-              <a:latin typeface="Roboto" panose="02000000000000000000" pitchFamily="2" charset="0"/>
-            </a:endParaRPr>
-          </a:p>
-          <a:p>
-            <a:pPr marL="285750" indent="-285750" algn="r" rtl="1">
-              <a:buFontTx/>
-              <a:buChar char="-"/>
-            </a:pPr>
+              <a:t>- میزان از دست دادن را کاهش می دهد</a:t>
+            </a:r>
+          </a:p>
+          <a:p>
+            <a:pPr algn="r" rtl="1"/>
             <a:r>
               <a:rPr lang="fa-IR" b="0" i="0" dirty="0">
                 <a:solidFill>
@@ -19016,7 +19096,7 @@
                 <a:effectLst/>
                 <a:latin typeface="Roboto" panose="02000000000000000000" pitchFamily="2" charset="0"/>
               </a:rPr>
-              <a:t>زمان ضربه را به دلیل جستجوی موازی افزایش می دهد و سپس واکشی می کند</a:t>
+              <a:t>-زمان ضربه را به دلیل جستجوی موازی افزایش می دهد و سپس واکشی می کند</a:t>
             </a:r>
           </a:p>
         </p:txBody>
@@ -19123,8 +19203,8 @@
         </p:nvSpPr>
         <p:spPr>
           <a:xfrm>
-            <a:off x="111965" y="792778"/>
-            <a:ext cx="4390052" cy="5632311"/>
+            <a:off x="111965" y="1048940"/>
+            <a:ext cx="4390052" cy="5355312"/>
           </a:xfrm>
           <a:prstGeom prst="rect">
             <a:avLst/>
@@ -19136,15 +19216,6 @@
             <a:spAutoFit/>
           </a:bodyPr>
           <a:lstStyle/>
-          <a:p>
-            <a:pPr algn="l"/>
-            <a:endParaRPr lang="en-US" sz="1800" b="0" i="0" u="none" strike="noStrike" baseline="0" dirty="0">
-              <a:solidFill>
-                <a:srgbClr val="000000"/>
-              </a:solidFill>
-              <a:latin typeface="Arial" panose="020B0604020202020204" pitchFamily="34" charset="0"/>
-            </a:endParaRPr>
-          </a:p>
           <a:p>
             <a:r>
               <a:rPr lang="en-US" sz="1800" b="0" i="0" u="none" strike="noStrike" baseline="0" dirty="0">
@@ -19980,7 +20051,7 @@
         <p:spPr>
           <a:xfrm>
             <a:off x="4641984" y="1048940"/>
-            <a:ext cx="4362054" cy="3970318"/>
+            <a:ext cx="4362054" cy="3693319"/>
           </a:xfrm>
           <a:prstGeom prst="rect">
             <a:avLst/>
@@ -20002,15 +20073,8 @@
                 <a:effectLst/>
                 <a:latin typeface="Roboto" panose="02000000000000000000" pitchFamily="2" charset="0"/>
               </a:rPr>
-              <a:t>• با توجه به ترتیب زیر از دسترسی های بلوک حافظه، تعداد موارد از دست دادن حافظه نهان با بلوک های چهار1 کلمه ای را بیابید:</a:t>
-            </a:r>
-            <a:endParaRPr lang="en-US" b="0" i="0" dirty="0">
-              <a:solidFill>
-                <a:srgbClr val="3C4043"/>
-              </a:solidFill>
-              <a:effectLst/>
-              <a:latin typeface="Roboto" panose="02000000000000000000" pitchFamily="2" charset="0"/>
-            </a:endParaRPr>
+              <a:t>• با توجه به ترتیب زیر از دسترسی های بلوک حافظه، تعداد موارد از دست دادن حافظه نهان با بلوک های چهار1 کلمه ای را بیابید: 0، 8، 0، 6، 8،</a:t>
+            </a:r>
           </a:p>
           <a:p>
             <a:pPr algn="r" rtl="1"/>
@@ -20022,20 +20086,11 @@
                 <a:effectLst/>
                 <a:latin typeface="Roboto" panose="02000000000000000000" pitchFamily="2" charset="0"/>
               </a:rPr>
-              <a:t> 0، 8، 0، 6، 8،•برای هر یک از پیکربندی های کش زیر</a:t>
-            </a:r>
-            <a:endParaRPr lang="en-US" b="0" i="0" dirty="0">
-              <a:solidFill>
-                <a:srgbClr val="3C4043"/>
-              </a:solidFill>
-              <a:effectLst/>
-              <a:latin typeface="Roboto" panose="02000000000000000000" pitchFamily="2" charset="0"/>
-            </a:endParaRPr>
-          </a:p>
-          <a:p>
-            <a:pPr marL="342900" indent="-342900" algn="r" rtl="1">
-              <a:buAutoNum type="arabicPeriod"/>
-            </a:pPr>
+              <a:t>•برای هر یک از پیکربندی های کش زیر</a:t>
+            </a:r>
+          </a:p>
+          <a:p>
+            <a:pPr algn="r" rtl="1"/>
             <a:r>
               <a:rPr lang="fa-IR" b="0" i="0" dirty="0">
                 <a:solidFill>
@@ -20044,20 +20099,11 @@
                 <a:effectLst/>
                 <a:latin typeface="Roboto" panose="02000000000000000000" pitchFamily="2" charset="0"/>
               </a:rPr>
-              <a:t>مستقیم نقشه برداریمجموعه </a:t>
-            </a:r>
-            <a:endParaRPr lang="en-US" b="0" i="0" dirty="0">
-              <a:solidFill>
-                <a:srgbClr val="3C4043"/>
-              </a:solidFill>
-              <a:effectLst/>
-              <a:latin typeface="Roboto" panose="02000000000000000000" pitchFamily="2" charset="0"/>
-            </a:endParaRPr>
-          </a:p>
-          <a:p>
-            <a:pPr marL="342900" indent="-342900" algn="r" rtl="1">
-              <a:buAutoNum type="arabicPeriod"/>
-            </a:pPr>
+              <a:t>1. مستقیم نقشه برداری</a:t>
+            </a:r>
+          </a:p>
+          <a:p>
+            <a:pPr algn="r" rtl="1"/>
             <a:r>
               <a:rPr lang="fa-IR" b="0" i="0" dirty="0">
                 <a:solidFill>
@@ -20066,7 +20112,7 @@
                 <a:effectLst/>
                 <a:latin typeface="Roboto" panose="02000000000000000000" pitchFamily="2" charset="0"/>
               </a:rPr>
-              <a:t>2.2 طرفه انجمنی (از خط مشی جایگزینی </a:t>
+              <a:t>مجموعه 2.2 طرفه انجمنی (از خط مشی جایگزینی </a:t>
             </a:r>
             <a:r>
               <a:rPr lang="en-US" b="0" i="0" dirty="0">
@@ -20088,18 +20134,9 @@
               </a:rPr>
               <a:t>استفاده کنید)</a:t>
             </a:r>
-            <a:endParaRPr lang="en-US" b="0" i="0" dirty="0">
-              <a:solidFill>
-                <a:srgbClr val="3C4043"/>
-              </a:solidFill>
-              <a:effectLst/>
-              <a:latin typeface="Roboto" panose="02000000000000000000" pitchFamily="2" charset="0"/>
-            </a:endParaRPr>
-          </a:p>
-          <a:p>
-            <a:pPr marL="342900" indent="-342900" algn="r" rtl="1">
-              <a:buAutoNum type="arabicPeriod"/>
-            </a:pPr>
+          </a:p>
+          <a:p>
+            <a:pPr algn="r" rtl="1"/>
             <a:r>
               <a:rPr lang="fa-IR" b="0" i="0" dirty="0">
                 <a:solidFill>
@@ -20108,38 +20145,31 @@
                 <a:effectLst/>
                 <a:latin typeface="Roboto" panose="02000000000000000000" pitchFamily="2" charset="0"/>
               </a:rPr>
-              <a:t>کاملا انجمنی• در مورد جایگزینی </a:t>
-            </a:r>
-            <a:r>
-              <a:rPr lang="en-US" b="0" i="0" dirty="0">
+              <a:t>3. کاملا انجمنی</a:t>
+            </a:r>
+          </a:p>
+          <a:p>
+            <a:pPr algn="r" rtl="1"/>
+            <a:r>
+              <a:rPr lang="fa-IR" b="0" i="0" dirty="0">
                 <a:solidFill>
                   <a:srgbClr val="3C4043"/>
                 </a:solidFill>
                 <a:effectLst/>
                 <a:latin typeface="Roboto" panose="02000000000000000000" pitchFamily="2" charset="0"/>
               </a:rPr>
-              <a:t>LRU (</a:t>
-            </a:r>
-            <a:r>
-              <a:rPr lang="fa-IR" b="0" i="0" dirty="0">
+              <a:t>• در مورد جایگزینی </a:t>
+            </a:r>
+            <a:r>
+              <a:rPr lang="en-US" b="0" i="0" dirty="0">
                 <a:solidFill>
                   <a:srgbClr val="3C4043"/>
                 </a:solidFill>
                 <a:effectLst/>
                 <a:latin typeface="Roboto" panose="02000000000000000000" pitchFamily="2" charset="0"/>
               </a:rPr>
-              <a:t>کمترین استفاده اخیر)</a:t>
-            </a:r>
-            <a:endParaRPr lang="en-US" b="0" i="0" dirty="0">
-              <a:solidFill>
-                <a:srgbClr val="3C4043"/>
-              </a:solidFill>
-              <a:effectLst/>
-              <a:latin typeface="Roboto" panose="02000000000000000000" pitchFamily="2" charset="0"/>
-            </a:endParaRPr>
-          </a:p>
-          <a:p>
-            <a:pPr algn="r" rtl="1"/>
+              <a:t>LRU (</a:t>
+            </a:r>
             <a:r>
               <a:rPr lang="fa-IR" b="0" i="0" dirty="0">
                 <a:solidFill>
@@ -20148,7 +20178,20 @@
                 <a:effectLst/>
                 <a:latin typeface="Roboto" panose="02000000000000000000" pitchFamily="2" charset="0"/>
               </a:rPr>
-              <a:t> توجه داشته باشید-در یک مجموعه دو طرفه انجمنی کش جایگزین </a:t>
+              <a:t>کمترین استفاده اخیر) توجه داشته باشید</a:t>
+            </a:r>
+          </a:p>
+          <a:p>
+            <a:pPr algn="r" rtl="1"/>
+            <a:r>
+              <a:rPr lang="fa-IR" b="0" i="0" dirty="0">
+                <a:solidFill>
+                  <a:srgbClr val="3C4043"/>
+                </a:solidFill>
+                <a:effectLst/>
+                <a:latin typeface="Roboto" panose="02000000000000000000" pitchFamily="2" charset="0"/>
+              </a:rPr>
+              <a:t>-در یک مجموعه دو طرفه انجمنی کش جایگزین </a:t>
             </a:r>
             <a:r>
               <a:rPr lang="en-US" b="0" i="0" dirty="0">
@@ -20275,8 +20318,8 @@
         </p:nvSpPr>
         <p:spPr>
           <a:xfrm>
-            <a:off x="111965" y="792778"/>
-            <a:ext cx="4390052" cy="4801314"/>
+            <a:off x="41982" y="1048940"/>
+            <a:ext cx="4390052" cy="4524315"/>
           </a:xfrm>
           <a:prstGeom prst="rect">
             <a:avLst/>
@@ -20288,18 +20331,6 @@
             <a:spAutoFit/>
           </a:bodyPr>
           <a:lstStyle/>
-          <a:p>
-            <a:pPr algn="l"/>
-            <a:endParaRPr lang="en-US" sz="1800" b="0" i="0" u="none" strike="noStrike" baseline="0" dirty="0">
-              <a:solidFill>
-                <a:schemeClr val="tx1">
-                  <a:lumMod val="95000"/>
-                  <a:lumOff val="5000"/>
-                </a:schemeClr>
-              </a:solidFill>
-              <a:latin typeface="Arial" panose="020B0604020202020204" pitchFamily="34" charset="0"/>
-            </a:endParaRPr>
-          </a:p>
           <a:p>
             <a:r>
               <a:rPr lang="en-US" sz="1800" b="0" i="0" u="none" strike="noStrike" baseline="0" dirty="0">
@@ -22421,8 +22452,8 @@
         </p:nvSpPr>
         <p:spPr>
           <a:xfrm>
-            <a:off x="4641984" y="1048940"/>
-            <a:ext cx="4362054" cy="2308324"/>
+            <a:off x="4502017" y="1048940"/>
+            <a:ext cx="4641983" cy="2031325"/>
           </a:xfrm>
           <a:prstGeom prst="rect">
             <a:avLst/>
@@ -22434,13 +22465,6 @@
             <a:spAutoFit/>
           </a:bodyPr>
           <a:lstStyle/>
-          <a:p>
-            <a:pPr algn="r" rtl="1"/>
-            <a:r>
-              <a:rPr lang="fa-IR" dirty="0"/>
-              <a:t>مثال مشکل</a:t>
-            </a:r>
-          </a:p>
           <a:p>
             <a:pPr algn="r" rtl="1"/>
             <a:r>
@@ -23021,15 +23045,18 @@
           <a:p>
             <a:pPr algn="r" rtl="1"/>
             <a:r>
-              <a:rPr lang="en-US" b="0" i="0" dirty="0">
+              <a:rPr lang="fa-IR" b="0" i="0" dirty="0">
                 <a:solidFill>
                   <a:srgbClr val="3C4043"/>
                 </a:solidFill>
                 <a:effectLst/>
                 <a:latin typeface="Roboto" panose="02000000000000000000" pitchFamily="2" charset="0"/>
               </a:rPr>
-              <a:t>• </a:t>
-            </a:r>
+              <a:t>• کاربران حافظه های بزرگ و سریع می خواهند…</a:t>
+            </a:r>
+          </a:p>
+          <a:p>
+            <a:pPr algn="r" rtl="1"/>
             <a:r>
               <a:rPr lang="fa-IR" b="0" i="0" dirty="0">
                 <a:solidFill>
@@ -23038,21 +23065,11 @@
                 <a:effectLst/>
                 <a:latin typeface="Roboto" panose="02000000000000000000" pitchFamily="2" charset="0"/>
               </a:rPr>
-              <a:t>کاربران حافظه های بزرگ و سریع می خواهند… </a:t>
-            </a:r>
-            <a:endParaRPr lang="en-US" b="0" i="0" dirty="0">
-              <a:solidFill>
-                <a:srgbClr val="3C4043"/>
-              </a:solidFill>
-              <a:effectLst/>
-              <a:latin typeface="Roboto" panose="02000000000000000000" pitchFamily="2" charset="0"/>
-            </a:endParaRPr>
-          </a:p>
-          <a:p>
-            <a:pPr marL="285750" indent="-285750" algn="r" rtl="1">
-              <a:buFontTx/>
-              <a:buChar char="-"/>
-            </a:pPr>
+              <a:t>- گران است و دوست ندارند پول بدهند…</a:t>
+            </a:r>
+          </a:p>
+          <a:p>
+            <a:pPr algn="r" rtl="1"/>
             <a:r>
               <a:rPr lang="fa-IR" b="0" i="0" dirty="0">
                 <a:solidFill>
@@ -23061,21 +23078,11 @@
                 <a:effectLst/>
                 <a:latin typeface="Roboto" panose="02000000000000000000" pitchFamily="2" charset="0"/>
               </a:rPr>
-              <a:t>گران است و دوست ندارند پول بدهند… </a:t>
-            </a:r>
-            <a:endParaRPr lang="en-US" b="0" i="0" dirty="0">
-              <a:solidFill>
-                <a:srgbClr val="3C4043"/>
-              </a:solidFill>
-              <a:effectLst/>
-              <a:latin typeface="Roboto" panose="02000000000000000000" pitchFamily="2" charset="0"/>
-            </a:endParaRPr>
-          </a:p>
-          <a:p>
-            <a:pPr marL="285750" indent="-285750" algn="r" rtl="1">
-              <a:buFontTx/>
-              <a:buChar char="-"/>
-            </a:pPr>
+              <a:t>• کاری کنید که به نظر برسد آنچه را که می خواهند…</a:t>
+            </a:r>
+          </a:p>
+          <a:p>
+            <a:pPr algn="r" rtl="1"/>
             <a:r>
               <a:rPr lang="fa-IR" b="0" i="0" dirty="0">
                 <a:solidFill>
@@ -23084,21 +23091,11 @@
                 <a:effectLst/>
                 <a:latin typeface="Roboto" panose="02000000000000000000" pitchFamily="2" charset="0"/>
               </a:rPr>
-              <a:t>• کاری کنید که به نظر برسد آنچه را که می خواهند… </a:t>
-            </a:r>
-            <a:endParaRPr lang="en-US" b="0" i="0" dirty="0">
-              <a:solidFill>
-                <a:srgbClr val="3C4043"/>
-              </a:solidFill>
-              <a:effectLst/>
-              <a:latin typeface="Roboto" panose="02000000000000000000" pitchFamily="2" charset="0"/>
-            </a:endParaRPr>
-          </a:p>
-          <a:p>
-            <a:pPr marL="285750" indent="-285750" algn="r" rtl="1">
-              <a:buFontTx/>
-              <a:buChar char="-"/>
-            </a:pPr>
+              <a:t>- سلسله مراتب حافظه</a:t>
+            </a:r>
+          </a:p>
+          <a:p>
+            <a:pPr algn="r" rtl="1"/>
             <a:r>
               <a:rPr lang="fa-IR" b="0" i="0" dirty="0">
                 <a:solidFill>
@@ -23107,15 +23104,8 @@
                 <a:effectLst/>
                 <a:latin typeface="Roboto" panose="02000000000000000000" pitchFamily="2" charset="0"/>
               </a:rPr>
-              <a:t>سلسله مراتب حافظه - سلسله مراتب فراگیر است، هر سطح زیرمجموعه سطح پایین تر است </a:t>
-            </a:r>
-            <a:endParaRPr lang="en-US" b="0" i="0" dirty="0">
-              <a:solidFill>
-                <a:srgbClr val="3C4043"/>
-              </a:solidFill>
-              <a:effectLst/>
-              <a:latin typeface="Roboto" panose="02000000000000000000" pitchFamily="2" charset="0"/>
-            </a:endParaRPr>
+              <a:t>- سلسله مراتب فراگیر است، هر سطح زیرمجموعه سطح پایین تر است</a:t>
+            </a:r>
           </a:p>
           <a:p>
             <a:pPr algn="r" rtl="1"/>
@@ -23247,7 +23237,7 @@
         <p:spPr>
           <a:xfrm>
             <a:off x="125964" y="867747"/>
-            <a:ext cx="4572000" cy="2893100"/>
+            <a:ext cx="4572000" cy="2708434"/>
           </a:xfrm>
           <a:prstGeom prst="rect">
             <a:avLst/>
@@ -23259,15 +23249,6 @@
             <a:spAutoFit/>
           </a:bodyPr>
           <a:lstStyle/>
-          <a:p>
-            <a:pPr algn="l"/>
-            <a:endParaRPr lang="en-US" sz="1200" b="0" i="0" u="none" strike="noStrike" baseline="0" dirty="0">
-              <a:solidFill>
-                <a:srgbClr val="000000"/>
-              </a:solidFill>
-              <a:latin typeface="Arial" panose="020B0604020202020204" pitchFamily="34" charset="0"/>
-            </a:endParaRPr>
-          </a:p>
           <a:p>
             <a:r>
               <a:rPr lang="en-US" sz="2000" b="0" i="0" u="none" strike="noStrike" baseline="0" dirty="0">
@@ -23488,7 +23469,7 @@
         </p:nvSpPr>
         <p:spPr>
           <a:xfrm>
-            <a:off x="4875246" y="1331449"/>
+            <a:off x="4835587" y="2281557"/>
             <a:ext cx="4156787" cy="923330"/>
           </a:xfrm>
           <a:prstGeom prst="rect">
@@ -23662,8 +23643,8 @@
         </p:nvSpPr>
         <p:spPr>
           <a:xfrm>
-            <a:off x="195941" y="978500"/>
-            <a:ext cx="4572000" cy="1200329"/>
+            <a:off x="151623" y="2281557"/>
+            <a:ext cx="4572000" cy="923330"/>
           </a:xfrm>
           <a:prstGeom prst="rect">
             <a:avLst/>
@@ -23675,15 +23656,6 @@
             <a:spAutoFit/>
           </a:bodyPr>
           <a:lstStyle/>
-          <a:p>
-            <a:pPr algn="l"/>
-            <a:endParaRPr lang="en-US" sz="1800" b="0" i="0" u="none" strike="noStrike" baseline="0" dirty="0">
-              <a:solidFill>
-                <a:srgbClr val="000000"/>
-              </a:solidFill>
-              <a:latin typeface="Arial" panose="020B0604020202020204" pitchFamily="34" charset="0"/>
-            </a:endParaRPr>
-          </a:p>
           <a:p>
             <a:r>
               <a:rPr lang="en-US" sz="1800" b="0" i="0" u="none" strike="noStrike" baseline="0" dirty="0">
@@ -23794,7 +23766,7 @@
         <p:spPr>
           <a:xfrm>
             <a:off x="4875246" y="1331449"/>
-            <a:ext cx="4156787" cy="2031325"/>
+            <a:ext cx="4156787" cy="2308324"/>
           </a:xfrm>
           <a:prstGeom prst="rect">
             <a:avLst/>
@@ -23816,18 +23788,24 @@
                 <a:effectLst/>
                 <a:latin typeface="Roboto" panose="02000000000000000000" pitchFamily="2" charset="0"/>
               </a:rPr>
-              <a:t>محلی بودن یک اصل است که داشتن سلسله مراتب حافظه را ایده خوبی می کند • اگر به یک آیتم ارجاع داده شده است، به دلیل -محل زمانی (مکان در زمان): همان مکان حافظه که دوباره به آن دسترسی پیدا کرد. مثال</a:t>
-            </a:r>
-            <a:r>
-              <a:rPr lang="en-US" b="0" i="0" dirty="0">
+              <a:t>محلی بودن یک اصل است که داشتن سلسله مراتب حافظه را ایده خوبی می کند</a:t>
+            </a:r>
+          </a:p>
+          <a:p>
+            <a:pPr algn="r" rtl="1"/>
+            <a:r>
+              <a:rPr lang="fa-IR" b="0" i="0" dirty="0">
                 <a:solidFill>
                   <a:srgbClr val="3C4043"/>
                 </a:solidFill>
                 <a:effectLst/>
                 <a:latin typeface="Roboto" panose="02000000000000000000" pitchFamily="2" charset="0"/>
               </a:rPr>
-              <a:t>: </a:t>
-            </a:r>
+              <a:t>• اگر به یک آیتم ارجاع داده شده است، به دلیل</a:t>
+            </a:r>
+          </a:p>
+          <a:p>
+            <a:pPr algn="r" rtl="1"/>
             <a:r>
               <a:rPr lang="fa-IR" b="0" i="0" dirty="0">
                 <a:solidFill>
@@ -23836,7 +23814,40 @@
                 <a:effectLst/>
                 <a:latin typeface="Roboto" panose="02000000000000000000" pitchFamily="2" charset="0"/>
               </a:rPr>
-              <a:t>حلقه ها -موقعیت مکانی (محلی در فضا): موارد نزدیک به زودی ارجاع داده خواهند شد. دستورالعمل ها معمولاً به صورت متوالی قابل دسترسی هستند</a:t>
+              <a:t>-محل زمانی (مکان در زمان): همان مکان حافظه که دوباره به آن دسترسی پیدا کرد. </a:t>
+            </a:r>
+            <a:r>
+              <a:rPr lang="en-US" b="0" i="0" dirty="0">
+                <a:solidFill>
+                  <a:srgbClr val="3C4043"/>
+                </a:solidFill>
+                <a:effectLst/>
+                <a:latin typeface="Roboto" panose="02000000000000000000" pitchFamily="2" charset="0"/>
+              </a:rPr>
+              <a:t>EX: </a:t>
+            </a:r>
+            <a:r>
+              <a:rPr lang="fa-IR" b="0" i="0" dirty="0">
+                <a:solidFill>
+                  <a:srgbClr val="3C4043"/>
+                </a:solidFill>
+                <a:effectLst/>
+                <a:latin typeface="Roboto" panose="02000000000000000000" pitchFamily="2" charset="0"/>
+              </a:rPr>
+              <a:t>حلقه ها</a:t>
+            </a:r>
+          </a:p>
+          <a:p>
+            <a:pPr algn="r" rtl="1"/>
+            <a:r>
+              <a:rPr lang="fa-IR" b="0" i="0" dirty="0">
+                <a:solidFill>
+                  <a:srgbClr val="3C4043"/>
+                </a:solidFill>
+                <a:effectLst/>
+                <a:latin typeface="Roboto" panose="02000000000000000000" pitchFamily="2" charset="0"/>
+              </a:rPr>
+              <a:t>-موقعیت مکانی (محلی در فضا): موارد نزدیک به زودی ارجاع داده خواهند شد. دستورالعمل ها معمولاً به صورت متوالی قابل دسترسی هستند</a:t>
             </a:r>
           </a:p>
         </p:txBody>
@@ -23955,8 +23966,8 @@
         </p:nvSpPr>
         <p:spPr>
           <a:xfrm>
-            <a:off x="195941" y="978500"/>
-            <a:ext cx="4264092" cy="3139321"/>
+            <a:off x="111967" y="1330235"/>
+            <a:ext cx="4264092" cy="2862322"/>
           </a:xfrm>
           <a:prstGeom prst="rect">
             <a:avLst/>
@@ -23968,15 +23979,6 @@
             <a:spAutoFit/>
           </a:bodyPr>
           <a:lstStyle/>
-          <a:p>
-            <a:pPr algn="l"/>
-            <a:endParaRPr lang="en-US" sz="1800" b="0" i="0" u="none" strike="noStrike" baseline="0" dirty="0">
-              <a:solidFill>
-                <a:srgbClr val="000000"/>
-              </a:solidFill>
-              <a:latin typeface="Gill Sans MT" panose="020B0502020104020203" pitchFamily="34" charset="0"/>
-            </a:endParaRPr>
-          </a:p>
           <a:p>
             <a:r>
               <a:rPr lang="en-US" sz="1800" b="0" i="1" u="none" strike="noStrike" baseline="0" dirty="0" err="1">
@@ -24157,8 +24159,8 @@
         </p:nvSpPr>
         <p:spPr>
           <a:xfrm>
-            <a:off x="4711961" y="846167"/>
-            <a:ext cx="4156787" cy="5078313"/>
+            <a:off x="4879912" y="523001"/>
+            <a:ext cx="4156787" cy="5909310"/>
           </a:xfrm>
           <a:prstGeom prst="rect">
             <a:avLst/>
@@ -24180,7 +24182,7 @@
                 <a:effectLst/>
                 <a:latin typeface="Roboto" panose="02000000000000000000" pitchFamily="2" charset="0"/>
               </a:rPr>
-              <a:t>• در سلسله مراتب حافظه روی هر دو سطح مجاور - به نام های بالا (نزدیک به </a:t>
+              <a:t>• در سلسله مراتب حافظه روی هر دو سطح مجاور – به نام بالا (نزدیک به </a:t>
             </a:r>
             <a:r>
               <a:rPr lang="en-US" b="0" i="0" dirty="0">
@@ -24200,7 +24202,7 @@
                 <a:effectLst/>
                 <a:latin typeface="Roboto" panose="02000000000000000000" pitchFamily="2" charset="0"/>
               </a:rPr>
-              <a:t>و پایین تر (دورتر از </a:t>
+              <a:t>و پایین (دورتر از </a:t>
             </a:r>
             <a:r>
               <a:rPr lang="en-US" b="0" i="0" dirty="0">
@@ -24210,7 +24212,7 @@
                 <a:effectLst/>
                 <a:latin typeface="Roboto" panose="02000000000000000000" pitchFamily="2" charset="0"/>
               </a:rPr>
-              <a:t>CPU)- </a:t>
+              <a:t>CPU) – </a:t>
             </a:r>
             <a:r>
               <a:rPr lang="fa-IR" b="0" i="0" dirty="0">
@@ -24222,7 +24224,10 @@
               </a:rPr>
               <a:t>تمرکز کنید، زیرا هر بلوک کپی همیشه بین دو سطح مجاور قرار دارد.</a:t>
             </a:r>
-            <a:endParaRPr lang="en-US" b="0" i="0" dirty="0">
+          </a:p>
+          <a:p>
+            <a:pPr algn="r" rtl="1"/>
+            <a:endParaRPr lang="fa-IR" b="0" i="0" dirty="0">
               <a:solidFill>
                 <a:srgbClr val="3C4043"/>
               </a:solidFill>
@@ -24240,38 +24245,44 @@
                 <a:effectLst/>
                 <a:latin typeface="Roboto" panose="02000000000000000000" pitchFamily="2" charset="0"/>
               </a:rPr>
-              <a:t>•واژه شناسی:-</a:t>
-            </a:r>
-            <a:r>
-              <a:rPr lang="en-US" b="0" i="0" dirty="0">
+              <a:t>•واژه شناسی:</a:t>
+            </a:r>
+          </a:p>
+          <a:p>
+            <a:pPr algn="r" rtl="1"/>
+            <a:r>
+              <a:rPr lang="fa-IR" b="0" i="0" dirty="0">
                 <a:solidFill>
                   <a:srgbClr val="3C4043"/>
                 </a:solidFill>
                 <a:effectLst/>
                 <a:latin typeface="Roboto" panose="02000000000000000000" pitchFamily="2" charset="0"/>
               </a:rPr>
-              <a:t>block: </a:t>
-            </a:r>
-            <a:r>
-              <a:rPr lang="fa-IR" b="0" i="0" dirty="0">
+              <a:t>-</a:t>
+            </a:r>
+            <a:r>
+              <a:rPr lang="en-US" b="0" i="0" dirty="0">
                 <a:solidFill>
                   <a:srgbClr val="3C4043"/>
                 </a:solidFill>
                 <a:effectLst/>
                 <a:latin typeface="Roboto" panose="02000000000000000000" pitchFamily="2" charset="0"/>
               </a:rPr>
-              <a:t>حداقل واحد داده برای جابجایی بین سطوح–</a:t>
-            </a:r>
-            <a:r>
-              <a:rPr lang="en-US" b="0" i="0" dirty="0">
+              <a:t>block: </a:t>
+            </a:r>
+            <a:r>
+              <a:rPr lang="fa-IR" b="0" i="0" dirty="0">
                 <a:solidFill>
                   <a:srgbClr val="3C4043"/>
                 </a:solidFill>
                 <a:effectLst/>
                 <a:latin typeface="Roboto" panose="02000000000000000000" pitchFamily="2" charset="0"/>
               </a:rPr>
-              <a:t>hit: </a:t>
-            </a:r>
+              <a:t>حداقل واحد داده برای جابجایی بین سطوح</a:t>
+            </a:r>
+          </a:p>
+          <a:p>
+            <a:pPr algn="r" rtl="1"/>
             <a:r>
               <a:rPr lang="fa-IR" b="0" i="0" dirty="0">
                 <a:solidFill>
@@ -24280,7 +24291,7 @@
                 <a:effectLst/>
                 <a:latin typeface="Roboto" panose="02000000000000000000" pitchFamily="2" charset="0"/>
               </a:rPr>
-              <a:t>داده های درخواستی در حافظه پنهان هستند– </a:t>
+              <a:t>–</a:t>
             </a:r>
             <a:r>
               <a:rPr lang="en-US" b="0" i="0" dirty="0">
@@ -24290,7 +24301,7 @@
                 <a:effectLst/>
                 <a:latin typeface="Roboto" panose="02000000000000000000" pitchFamily="2" charset="0"/>
               </a:rPr>
-              <a:t>miss: </a:t>
+              <a:t>hit: </a:t>
             </a:r>
             <a:r>
               <a:rPr lang="fa-IR" b="0" i="0" dirty="0">
@@ -24300,38 +24311,44 @@
                 <a:effectLst/>
                 <a:latin typeface="Roboto" panose="02000000000000000000" pitchFamily="2" charset="0"/>
               </a:rPr>
-              <a:t>داده های درخواستی در حافظه پنهان نیستند– نرخ ضربه: کسری از دسترسی‌های حافظه‌ای که بازدید دارند (یعنی در حافظه پنهان یافت می‌شوند)– </a:t>
-            </a:r>
-            <a:r>
-              <a:rPr lang="en-US" b="0" i="0" dirty="0">
+              <a:t>داده های درخواستی در حافظه پنهان هستند</a:t>
+            </a:r>
+          </a:p>
+          <a:p>
+            <a:pPr algn="r" rtl="1"/>
+            <a:r>
+              <a:rPr lang="fa-IR" b="0" i="0" dirty="0">
                 <a:solidFill>
                   <a:srgbClr val="3C4043"/>
                 </a:solidFill>
                 <a:effectLst/>
                 <a:latin typeface="Roboto" panose="02000000000000000000" pitchFamily="2" charset="0"/>
               </a:rPr>
-              <a:t>miss rate: </a:t>
-            </a:r>
-            <a:r>
-              <a:rPr lang="fa-IR" b="0" i="0" dirty="0">
+              <a:t>– </a:t>
+            </a:r>
+            <a:r>
+              <a:rPr lang="en-US" b="0" i="0" dirty="0">
                 <a:solidFill>
                   <a:srgbClr val="3C4043"/>
                 </a:solidFill>
                 <a:effectLst/>
                 <a:latin typeface="Roboto" panose="02000000000000000000" pitchFamily="2" charset="0"/>
               </a:rPr>
-              <a:t>کسری از دسترسی‌های حافظه‌ای که بازدید ندارند• نرخ از دست دادن = 1 - نرخ ضربه–</a:t>
-            </a:r>
-            <a:r>
-              <a:rPr lang="en-US" b="0" i="0" dirty="0">
+              <a:t>miss: </a:t>
+            </a:r>
+            <a:r>
+              <a:rPr lang="fa-IR" b="0" i="0" dirty="0">
                 <a:solidFill>
                   <a:srgbClr val="3C4043"/>
                 </a:solidFill>
                 <a:effectLst/>
                 <a:latin typeface="Roboto" panose="02000000000000000000" pitchFamily="2" charset="0"/>
               </a:rPr>
-              <a:t>hit time: </a:t>
-            </a:r>
+              <a:t>داده های درخواستی در حافظه پنهان نیستند</a:t>
+            </a:r>
+          </a:p>
+          <a:p>
+            <a:pPr algn="r" rtl="1"/>
             <a:r>
               <a:rPr lang="fa-IR" b="0" i="0" dirty="0">
                 <a:solidFill>
@@ -24340,17 +24357,109 @@
                 <a:effectLst/>
                 <a:latin typeface="Roboto" panose="02000000000000000000" pitchFamily="2" charset="0"/>
               </a:rPr>
-              <a:t>زمان تعیین اینکه آیا دسترسی واقعاً یک ضربه است + زمان دسترسی و تحویل داده ها از حافظه پنهان به </a:t>
-            </a:r>
-            <a:r>
-              <a:rPr lang="en-US" b="0" i="0" dirty="0">
+              <a:t>– نرخ ضربه: کسری از دسترسی‌های حافظه‌ای که بازدید دارند (یعنی در حافظه پنهان یافت می‌شوند)</a:t>
+            </a:r>
+          </a:p>
+          <a:p>
+            <a:pPr algn="r" rtl="1"/>
+            <a:r>
+              <a:rPr lang="fa-IR" b="0" i="0" dirty="0">
                 <a:solidFill>
                   <a:srgbClr val="3C4043"/>
                 </a:solidFill>
                 <a:effectLst/>
                 <a:latin typeface="Roboto" panose="02000000000000000000" pitchFamily="2" charset="0"/>
               </a:rPr>
-              <a:t>CPU– </a:t>
+              <a:t>– </a:t>
+            </a:r>
+            <a:r>
+              <a:rPr lang="en-US" b="0" i="0" dirty="0">
+                <a:solidFill>
+                  <a:srgbClr val="3C4043"/>
+                </a:solidFill>
+                <a:effectLst/>
+                <a:latin typeface="Roboto" panose="02000000000000000000" pitchFamily="2" charset="0"/>
+              </a:rPr>
+              <a:t>miss rate: </a:t>
+            </a:r>
+            <a:r>
+              <a:rPr lang="fa-IR" b="0" i="0" dirty="0">
+                <a:solidFill>
+                  <a:srgbClr val="3C4043"/>
+                </a:solidFill>
+                <a:effectLst/>
+                <a:latin typeface="Roboto" panose="02000000000000000000" pitchFamily="2" charset="0"/>
+              </a:rPr>
+              <a:t>کسری از دسترسی‌های حافظه‌ای که بازدید ندارند</a:t>
+            </a:r>
+          </a:p>
+          <a:p>
+            <a:pPr algn="r" rtl="1"/>
+            <a:r>
+              <a:rPr lang="fa-IR" b="0" i="0" dirty="0">
+                <a:solidFill>
+                  <a:srgbClr val="3C4043"/>
+                </a:solidFill>
+                <a:effectLst/>
+                <a:latin typeface="Roboto" panose="02000000000000000000" pitchFamily="2" charset="0"/>
+              </a:rPr>
+              <a:t>• نرخ از دست دادن = 1 - نرخ ضربه</a:t>
+            </a:r>
+          </a:p>
+          <a:p>
+            <a:pPr algn="r" rtl="1"/>
+            <a:r>
+              <a:rPr lang="fa-IR" b="0" i="0" dirty="0">
+                <a:solidFill>
+                  <a:srgbClr val="3C4043"/>
+                </a:solidFill>
+                <a:effectLst/>
+                <a:latin typeface="Roboto" panose="02000000000000000000" pitchFamily="2" charset="0"/>
+              </a:rPr>
+              <a:t>–</a:t>
+            </a:r>
+            <a:r>
+              <a:rPr lang="en-US" b="0" i="0" dirty="0">
+                <a:solidFill>
+                  <a:srgbClr val="3C4043"/>
+                </a:solidFill>
+                <a:effectLst/>
+                <a:latin typeface="Roboto" panose="02000000000000000000" pitchFamily="2" charset="0"/>
+              </a:rPr>
+              <a:t>hit time: </a:t>
+            </a:r>
+            <a:r>
+              <a:rPr lang="fa-IR" b="0" i="0" dirty="0">
+                <a:solidFill>
+                  <a:srgbClr val="3C4043"/>
+                </a:solidFill>
+                <a:effectLst/>
+                <a:latin typeface="Roboto" panose="02000000000000000000" pitchFamily="2" charset="0"/>
+              </a:rPr>
+              <a:t>زمان تعیین اینکه آیا دسترسی واقعاً یک ضربه است + زمان دسترسی و تحویل داده ها از حافظه پنهان به </a:t>
+            </a:r>
+            <a:r>
+              <a:rPr lang="en-US" b="0" i="0" dirty="0">
+                <a:solidFill>
+                  <a:srgbClr val="3C4043"/>
+                </a:solidFill>
+                <a:effectLst/>
+                <a:latin typeface="Roboto" panose="02000000000000000000" pitchFamily="2" charset="0"/>
+              </a:rPr>
+              <a:t>CPU</a:t>
+            </a:r>
+          </a:p>
+          <a:p>
+            <a:pPr algn="r" rtl="1"/>
+            <a:r>
+              <a:rPr lang="en-US" b="0" i="0" dirty="0">
+                <a:solidFill>
+                  <a:srgbClr val="3C4043"/>
+                </a:solidFill>
+                <a:effectLst/>
+                <a:latin typeface="Roboto" panose="02000000000000000000" pitchFamily="2" charset="0"/>
+              </a:rPr>
+              <a:t>– </a:t>
             </a:r>
             <a:r>
               <a:rPr lang="fa-IR" b="0" i="0" dirty="0">
@@ -24393,13 +24502,14 @@
           </p:cNvPr>
           <p:cNvCxnSpPr>
             <a:cxnSpLocks/>
+            <a:stCxn id="20" idx="2"/>
           </p:cNvCxnSpPr>
           <p:nvPr/>
         </p:nvCxnSpPr>
         <p:spPr>
-          <a:xfrm>
-            <a:off x="4548673" y="1013346"/>
-            <a:ext cx="0" cy="5644818"/>
+          <a:xfrm flipH="1">
+            <a:off x="4548673" y="369332"/>
+            <a:ext cx="23327" cy="6088996"/>
           </a:xfrm>
           <a:prstGeom prst="line">
             <a:avLst/>
@@ -24442,7 +24552,7 @@
         </p:nvSpPr>
         <p:spPr>
           <a:xfrm>
-            <a:off x="3326364" y="199836"/>
+            <a:off x="3326364" y="0"/>
             <a:ext cx="2491272" cy="369332"/>
           </a:xfrm>
           <a:prstGeom prst="rect">
@@ -24485,7 +24595,7 @@
         <p:spPr>
           <a:xfrm>
             <a:off x="18660" y="523001"/>
-            <a:ext cx="4366727" cy="6632585"/>
+            <a:ext cx="4366727" cy="6370975"/>
           </a:xfrm>
           <a:prstGeom prst="rect">
             <a:avLst/>
@@ -24497,15 +24607,6 @@
             <a:spAutoFit/>
           </a:bodyPr>
           <a:lstStyle/>
-          <a:p>
-            <a:pPr algn="l"/>
-            <a:endParaRPr lang="en-US" sz="1700" b="0" i="0" u="none" strike="noStrike" baseline="0" dirty="0">
-              <a:solidFill>
-                <a:srgbClr val="000000"/>
-              </a:solidFill>
-              <a:latin typeface="Arial" panose="020B0604020202020204" pitchFamily="34" charset="0"/>
-            </a:endParaRPr>
-          </a:p>
           <a:p>
             <a:r>
               <a:rPr lang="en-US" sz="1700" b="0" i="0" u="none" strike="noStrike" baseline="0" dirty="0">
@@ -24905,7 +25006,7 @@
         <p:spPr>
           <a:xfrm>
             <a:off x="4711962" y="1013346"/>
-            <a:ext cx="4156787" cy="1754326"/>
+            <a:ext cx="4156787" cy="2308324"/>
           </a:xfrm>
           <a:prstGeom prst="rect">
             <a:avLst/>
@@ -24920,57 +25021,50 @@
           <a:p>
             <a:pPr algn="r" rtl="1"/>
             <a:r>
-              <a:rPr lang="en-US" b="0" i="0" dirty="0">
-                <a:solidFill>
-                  <a:srgbClr val="FFFFFF"/>
-                </a:solidFill>
-                <a:effectLst/>
-                <a:latin typeface="Roboto" panose="02000000000000000000" pitchFamily="2" charset="0"/>
-              </a:rPr>
-              <a:t>S</a:t>
-            </a:r>
-            <a:r>
-              <a:rPr lang="en-US" b="0" i="0" dirty="0">
-                <a:solidFill>
-                  <a:srgbClr val="3C4043"/>
-                </a:solidFill>
-                <a:effectLst/>
-                <a:latin typeface="Roboto" panose="02000000000000000000" pitchFamily="2" charset="0"/>
-              </a:rPr>
-              <a:t>• </a:t>
-            </a:r>
-            <a:r>
-              <a:rPr lang="fa-IR" b="0" i="0" dirty="0">
-                <a:solidFill>
-                  <a:srgbClr val="3C4043"/>
-                </a:solidFill>
-                <a:effectLst/>
-                <a:latin typeface="Roboto" panose="02000000000000000000" pitchFamily="2" charset="0"/>
-              </a:rPr>
-              <a:t>با مثال ساده – فرض کنید اندازه بلوک = یک کلمه داده</a:t>
+              <a:rPr lang="fa-IR" dirty="0"/>
+              <a:t>• با مثال ساده</a:t>
             </a:r>
           </a:p>
           <a:p>
             <a:pPr algn="r" rtl="1"/>
             <a:r>
-              <a:rPr lang="en-US" b="0" i="0" dirty="0">
-                <a:solidFill>
-                  <a:srgbClr val="3C4043"/>
-                </a:solidFill>
-                <a:effectLst/>
-                <a:latin typeface="Roboto" panose="02000000000000000000" pitchFamily="2" charset="0"/>
-              </a:rPr>
-              <a:t>• </a:t>
-            </a:r>
-            <a:r>
-              <a:rPr lang="fa-IR" b="0" i="0" dirty="0">
-                <a:solidFill>
-                  <a:srgbClr val="3C4043"/>
-                </a:solidFill>
-                <a:effectLst/>
-                <a:latin typeface="Roboto" panose="02000000000000000000" pitchFamily="2" charset="0"/>
-              </a:rPr>
-              <a:t>مسائل: - چگونه بفهمیم که یک آیتم داده در حافظه پنهان است؟ - اگر هست، چگونه آن را پیدا کنیم؟ - اگر نه، چه کار کنیم؟ • راه حل به طرح آدرس دهی کش بستگی دارد…</a:t>
+              <a:rPr lang="fa-IR" dirty="0"/>
+              <a:t>- فرض کنید اندازه بلوک = یک کلمه داده</a:t>
+            </a:r>
+          </a:p>
+          <a:p>
+            <a:pPr algn="r" rtl="1"/>
+            <a:r>
+              <a:rPr lang="fa-IR" dirty="0"/>
+              <a:t>• مسائل:</a:t>
+            </a:r>
+          </a:p>
+          <a:p>
+            <a:pPr algn="r" rtl="1"/>
+            <a:r>
+              <a:rPr lang="fa-IR" dirty="0"/>
+              <a:t>- چگونه بفهمیم که یک آیتم داده در حافظه پنهان است؟</a:t>
+            </a:r>
+          </a:p>
+          <a:p>
+            <a:pPr algn="r" rtl="1"/>
+            <a:r>
+              <a:rPr lang="fa-IR" dirty="0"/>
+              <a:t>- اگر هست، چگونه آن را پیدا کنیم؟</a:t>
+            </a:r>
+          </a:p>
+          <a:p>
+            <a:pPr algn="r" rtl="1"/>
+            <a:r>
+              <a:rPr lang="fa-IR" dirty="0"/>
+              <a:t>- اگر نه، چه کار کنیم؟</a:t>
+            </a:r>
+          </a:p>
+          <a:p>
+            <a:pPr algn="r" rtl="1"/>
+            <a:r>
+              <a:rPr lang="fa-IR" dirty="0"/>
+              <a:t>• راه حل به طرح آدرس دهی کش بستگی دارد…</a:t>
             </a:r>
           </a:p>
         </p:txBody>
@@ -25090,7 +25184,7 @@
         <p:spPr>
           <a:xfrm>
             <a:off x="65313" y="846167"/>
-            <a:ext cx="4366727" cy="2862322"/>
+            <a:ext cx="4366727" cy="2585323"/>
           </a:xfrm>
           <a:prstGeom prst="rect">
             <a:avLst/>
@@ -25102,15 +25196,6 @@
             <a:spAutoFit/>
           </a:bodyPr>
           <a:lstStyle/>
-          <a:p>
-            <a:pPr algn="l"/>
-            <a:endParaRPr lang="en-US" sz="1800" b="0" i="0" u="none" strike="noStrike" baseline="0" dirty="0">
-              <a:solidFill>
-                <a:srgbClr val="000000"/>
-              </a:solidFill>
-              <a:latin typeface="Arial" panose="020B0604020202020204" pitchFamily="34" charset="0"/>
-            </a:endParaRPr>
-          </a:p>
           <a:p>
             <a:r>
               <a:rPr lang="en-US" sz="1800" b="0" i="0" u="none" strike="noStrike" baseline="0" dirty="0">
@@ -26119,15 +26204,6 @@
 </file>
 
 <file path=customXml/item1.xml><?xml version="1.0" encoding="utf-8"?>
-<p:properties xmlns:p="http://schemas.microsoft.com/office/2006/metadata/properties" xmlns:xsi="http://www.w3.org/2001/XMLSchema-instance" xmlns:pc="http://schemas.microsoft.com/office/infopath/2007/PartnerControls">
-  <documentManagement>
-    <Status xmlns="71af3243-3dd4-4a8d-8c0d-dd76da1f02a5">Not started</Status>
-    <MediaServiceKeyPoints xmlns="71af3243-3dd4-4a8d-8c0d-dd76da1f02a5" xsi:nil="true"/>
-  </documentManagement>
-</p:properties>
-</file>
-
-<file path=customXml/item2.xml><?xml version="1.0" encoding="utf-8"?>
 <ct:contentTypeSchema xmlns:ct="http://schemas.microsoft.com/office/2006/metadata/contentType" xmlns:ma="http://schemas.microsoft.com/office/2006/metadata/properties/metaAttributes" ct:_="" ma:_="" ma:contentTypeName="Document" ma:contentTypeID="0x01010079F111ED35F8CC479449609E8A0923A6" ma:contentTypeVersion="12" ma:contentTypeDescription="Create a new document." ma:contentTypeScope="" ma:versionID="426e97fa315356fffbdcd9876fe988c2">
   <xsd:schema xmlns:xsd="http://www.w3.org/2001/XMLSchema" xmlns:xs="http://www.w3.org/2001/XMLSchema" xmlns:p="http://schemas.microsoft.com/office/2006/metadata/properties" xmlns:ns2="71af3243-3dd4-4a8d-8c0d-dd76da1f02a5" xmlns:ns3="16c05727-aa75-4e4a-9b5f-8a80a1165891" targetNamespace="http://schemas.microsoft.com/office/2006/metadata/properties" ma:root="true" ma:fieldsID="14b8f0def80e6d70ce3def20c90759ae" ns2:_="" ns3:_="">
     <xsd:import namespace="71af3243-3dd4-4a8d-8c0d-dd76da1f02a5"/>
@@ -26348,7 +26424,7 @@
 </ct:contentTypeSchema>
 </file>
 
-<file path=customXml/item3.xml><?xml version="1.0" encoding="utf-8"?>
+<file path=customXml/item2.xml><?xml version="1.0" encoding="utf-8"?>
 <?mso-contentType ?>
 <FormTemplates xmlns="http://schemas.microsoft.com/sharepoint/v3/contenttype/forms">
   <Display>DocumentLibraryForm</Display>
@@ -26357,17 +26433,16 @@
 </FormTemplates>
 </file>
 
-<file path=customXml/itemProps1.xml><?xml version="1.0" encoding="utf-8"?>
-<ds:datastoreItem xmlns:ds="http://schemas.openxmlformats.org/officeDocument/2006/customXml" ds:itemID="{E3D9F223-918A-45AF-9B53-56AB9E5E2182}">
-  <ds:schemaRefs>
-    <ds:schemaRef ds:uri="http://schemas.microsoft.com/office/2006/metadata/properties"/>
-    <ds:schemaRef ds:uri="http://schemas.microsoft.com/office/infopath/2007/PartnerControls"/>
-    <ds:schemaRef ds:uri="71af3243-3dd4-4a8d-8c0d-dd76da1f02a5"/>
-  </ds:schemaRefs>
-</ds:datastoreItem>
+<file path=customXml/item3.xml><?xml version="1.0" encoding="utf-8"?>
+<p:properties xmlns:p="http://schemas.microsoft.com/office/2006/metadata/properties" xmlns:xsi="http://www.w3.org/2001/XMLSchema-instance" xmlns:pc="http://schemas.microsoft.com/office/infopath/2007/PartnerControls">
+  <documentManagement>
+    <Status xmlns="71af3243-3dd4-4a8d-8c0d-dd76da1f02a5">Not started</Status>
+    <MediaServiceKeyPoints xmlns="71af3243-3dd4-4a8d-8c0d-dd76da1f02a5" xsi:nil="true"/>
+  </documentManagement>
+</p:properties>
 </file>
 
-<file path=customXml/itemProps2.xml><?xml version="1.0" encoding="utf-8"?>
+<file path=customXml/itemProps1.xml><?xml version="1.0" encoding="utf-8"?>
 <ds:datastoreItem xmlns:ds="http://schemas.openxmlformats.org/officeDocument/2006/customXml" ds:itemID="{55BB9993-D5F9-46FA-B2E5-80E3632E9820}">
   <ds:schemaRefs>
     <ds:schemaRef ds:uri="http://schemas.microsoft.com/office/2006/metadata/contentType"/>
@@ -26386,10 +26461,20 @@
 </ds:datastoreItem>
 </file>
 
-<file path=customXml/itemProps3.xml><?xml version="1.0" encoding="utf-8"?>
+<file path=customXml/itemProps2.xml><?xml version="1.0" encoding="utf-8"?>
 <ds:datastoreItem xmlns:ds="http://schemas.openxmlformats.org/officeDocument/2006/customXml" ds:itemID="{1B7E2D32-4FDD-4266-880C-17595B801432}">
   <ds:schemaRefs>
     <ds:schemaRef ds:uri="http://schemas.microsoft.com/sharepoint/v3/contenttype/forms"/>
   </ds:schemaRefs>
 </ds:datastoreItem>
+</file>
+
+<file path=customXml/itemProps3.xml><?xml version="1.0" encoding="utf-8"?>
+<ds:datastoreItem xmlns:ds="http://schemas.openxmlformats.org/officeDocument/2006/customXml" ds:itemID="{E3D9F223-918A-45AF-9B53-56AB9E5E2182}">
+  <ds:schemaRefs>
+    <ds:schemaRef ds:uri="http://schemas.microsoft.com/office/2006/metadata/properties"/>
+    <ds:schemaRef ds:uri="http://schemas.microsoft.com/office/infopath/2007/PartnerControls"/>
+    <ds:schemaRef ds:uri="71af3243-3dd4-4a8d-8c0d-dd76da1f02a5"/>
+  </ds:schemaRefs>
+</ds:datastoreItem>
 </file>
</xml_diff>